<commit_message>
190226 update slide 2
</commit_message>
<xml_diff>
--- a/CosmosDBSPDemo.pptx
+++ b/CosmosDBSPDemo.pptx
@@ -2,13 +2,14 @@
 <file path=ppt/presentation.xml><?xml version="1.0" encoding="utf-8"?>
 <p:presentation xmlns:a="http://schemas.openxmlformats.org/drawingml/2006/main" xmlns:r="http://schemas.openxmlformats.org/officeDocument/2006/relationships" xmlns:p="http://schemas.openxmlformats.org/presentationml/2006/main" saveSubsetFonts="1">
   <p:sldMasterIdLst>
-    <p:sldMasterId id="2147483660" r:id="rId1"/>
+    <p:sldMasterId id="2147483708" r:id="rId1"/>
   </p:sldMasterIdLst>
   <p:sldIdLst>
     <p:sldId id="259" r:id="rId2"/>
     <p:sldId id="260" r:id="rId3"/>
     <p:sldId id="256" r:id="rId4"/>
-    <p:sldId id="258" r:id="rId5"/>
+    <p:sldId id="261" r:id="rId5"/>
+    <p:sldId id="258" r:id="rId6"/>
   </p:sldIdLst>
   <p:sldSz cx="12192000" cy="6858000"/>
   <p:notesSz cx="6858000" cy="9144000"/>
@@ -107,11 +108,16 @@
       </a:defRPr>
     </a:lvl9pPr>
   </p:defaultTextStyle>
+  <p:extLst>
+    <p:ext uri="{EFAFB233-063F-42B5-8137-9DF3F51BA10A}">
+      <p15:sldGuideLst xmlns:p15="http://schemas.microsoft.com/office/powerpoint/2012/main"/>
+    </p:ext>
+  </p:extLst>
 </p:presentation>
 </file>
 
 <file path=ppt/slideLayouts/slideLayout1.xml><?xml version="1.0" encoding="utf-8"?>
-<p:sldLayout xmlns:a="http://schemas.openxmlformats.org/drawingml/2006/main" xmlns:r="http://schemas.openxmlformats.org/officeDocument/2006/relationships" xmlns:p="http://schemas.openxmlformats.org/presentationml/2006/main" showMasterSp="0" type="title" preserve="1">
+<p:sldLayout xmlns:a="http://schemas.openxmlformats.org/drawingml/2006/main" xmlns:r="http://schemas.openxmlformats.org/officeDocument/2006/relationships" xmlns:p="http://schemas.openxmlformats.org/presentationml/2006/main" type="title" preserve="1">
   <p:cSld name="Title Slide">
     <p:spTree>
       <p:nvGrpSpPr>
@@ -129,185 +135,90 @@
       </p:grpSpPr>
       <p:sp>
         <p:nvSpPr>
-          <p:cNvPr id="7" name="Rectangle 6"/>
-          <p:cNvSpPr/>
-          <p:nvPr/>
+          <p:cNvPr id="2" name="Title 1"/>
+          <p:cNvSpPr>
+            <a:spLocks noGrp="1"/>
+          </p:cNvSpPr>
+          <p:nvPr>
+            <p:ph type="ctrTitle"/>
+          </p:nvPr>
         </p:nvSpPr>
         <p:spPr>
           <a:xfrm>
-            <a:off x="3175" y="6400800"/>
-            <a:ext cx="12188825" cy="457200"/>
+            <a:off x="1524000" y="1122363"/>
+            <a:ext cx="9144000" cy="2387600"/>
           </a:xfrm>
-          <a:prstGeom prst="rect">
-            <a:avLst/>
-          </a:prstGeom>
-          <a:solidFill>
-            <a:schemeClr val="accent2"/>
-          </a:solidFill>
-          <a:ln>
-            <a:noFill/>
-          </a:ln>
         </p:spPr>
-        <p:style>
-          <a:lnRef idx="2">
-            <a:schemeClr val="accent1">
-              <a:shade val="50000"/>
-            </a:schemeClr>
-          </a:lnRef>
-          <a:fillRef idx="1">
-            <a:schemeClr val="accent1"/>
-          </a:fillRef>
-          <a:effectRef idx="0">
-            <a:schemeClr val="accent1"/>
-          </a:effectRef>
-          <a:fontRef idx="minor">
-            <a:schemeClr val="lt1"/>
-          </a:fontRef>
-        </p:style>
-      </p:sp>
-      <p:sp>
-        <p:nvSpPr>
-          <p:cNvPr id="8" name="Rectangle 7"/>
-          <p:cNvSpPr/>
-          <p:nvPr/>
+        <p:txBody>
+          <a:bodyPr anchor="b"/>
+          <a:lstStyle>
+            <a:lvl1pPr algn="ctr">
+              <a:defRPr sz="6000"/>
+            </a:lvl1pPr>
+          </a:lstStyle>
+          <a:p>
+            <a:r>
+              <a:rPr lang="en-US"/>
+              <a:t>Click to edit Master title style</a:t>
+            </a:r>
+            <a:endParaRPr lang="en-US" dirty="0"/>
+          </a:p>
+        </p:txBody>
+      </p:sp>
+      <p:sp>
+        <p:nvSpPr>
+          <p:cNvPr id="3" name="Subtitle 2"/>
+          <p:cNvSpPr>
+            <a:spLocks noGrp="1"/>
+          </p:cNvSpPr>
+          <p:nvPr>
+            <p:ph type="subTitle" idx="1"/>
+          </p:nvPr>
         </p:nvSpPr>
         <p:spPr>
           <a:xfrm>
-            <a:off x="15" y="6334316"/>
-            <a:ext cx="12188825" cy="64008"/>
-          </a:xfrm>
-          <a:prstGeom prst="rect">
-            <a:avLst/>
-          </a:prstGeom>
-          <a:solidFill>
-            <a:schemeClr val="accent1"/>
-          </a:solidFill>
-          <a:ln>
-            <a:noFill/>
-          </a:ln>
-        </p:spPr>
-        <p:style>
-          <a:lnRef idx="2">
-            <a:schemeClr val="accent1">
-              <a:shade val="50000"/>
-            </a:schemeClr>
-          </a:lnRef>
-          <a:fillRef idx="1">
-            <a:schemeClr val="accent1"/>
-          </a:fillRef>
-          <a:effectRef idx="0">
-            <a:schemeClr val="accent1"/>
-          </a:effectRef>
-          <a:fontRef idx="minor">
-            <a:schemeClr val="lt1"/>
-          </a:fontRef>
-        </p:style>
-      </p:sp>
-      <p:sp>
-        <p:nvSpPr>
-          <p:cNvPr id="2" name="Title 1"/>
-          <p:cNvSpPr>
-            <a:spLocks noGrp="1"/>
-          </p:cNvSpPr>
-          <p:nvPr>
-            <p:ph type="ctrTitle"/>
-          </p:nvPr>
-        </p:nvSpPr>
-        <p:spPr>
-          <a:xfrm>
-            <a:off x="1097280" y="758952"/>
-            <a:ext cx="10058400" cy="3566160"/>
+            <a:off x="1524000" y="3602038"/>
+            <a:ext cx="9144000" cy="1655762"/>
           </a:xfrm>
         </p:spPr>
         <p:txBody>
-          <a:bodyPr anchor="b">
-            <a:normAutofit/>
-          </a:bodyPr>
+          <a:bodyPr/>
           <a:lstStyle>
-            <a:lvl1pPr algn="l">
-              <a:lnSpc>
-                <a:spcPct val="85000"/>
-              </a:lnSpc>
-              <a:defRPr sz="8000" spc="-50" baseline="0">
-                <a:solidFill>
-                  <a:schemeClr val="tx1">
-                    <a:lumMod val="85000"/>
-                    <a:lumOff val="15000"/>
-                  </a:schemeClr>
-                </a:solidFill>
-              </a:defRPr>
-            </a:lvl1pPr>
-          </a:lstStyle>
-          <a:p>
-            <a:r>
-              <a:rPr lang="en-US"/>
-              <a:t>Click to edit Master title style</a:t>
-            </a:r>
-            <a:endParaRPr lang="en-US" dirty="0"/>
-          </a:p>
-        </p:txBody>
-      </p:sp>
-      <p:sp>
-        <p:nvSpPr>
-          <p:cNvPr id="3" name="Subtitle 2"/>
-          <p:cNvSpPr>
-            <a:spLocks noGrp="1"/>
-          </p:cNvSpPr>
-          <p:nvPr>
-            <p:ph type="subTitle" idx="1"/>
-          </p:nvPr>
-        </p:nvSpPr>
-        <p:spPr>
-          <a:xfrm>
-            <a:off x="1100051" y="4455620"/>
-            <a:ext cx="10058400" cy="1143000"/>
-          </a:xfrm>
-        </p:spPr>
-        <p:txBody>
-          <a:bodyPr lIns="91440" rIns="91440">
-            <a:normAutofit/>
-          </a:bodyPr>
-          <a:lstStyle>
-            <a:lvl1pPr marL="0" indent="0" algn="l">
-              <a:buNone/>
-              <a:defRPr sz="2400" cap="all" spc="200" baseline="0">
-                <a:solidFill>
-                  <a:schemeClr val="tx2"/>
-                </a:solidFill>
-                <a:latin typeface="+mj-lt"/>
-              </a:defRPr>
+            <a:lvl1pPr marL="0" indent="0" algn="ctr">
+              <a:buNone/>
+              <a:defRPr sz="2400"/>
             </a:lvl1pPr>
             <a:lvl2pPr marL="457200" indent="0" algn="ctr">
               <a:buNone/>
-              <a:defRPr sz="2400"/>
+              <a:defRPr sz="2000"/>
             </a:lvl2pPr>
             <a:lvl3pPr marL="914400" indent="0" algn="ctr">
               <a:buNone/>
-              <a:defRPr sz="2400"/>
+              <a:defRPr sz="1800"/>
             </a:lvl3pPr>
             <a:lvl4pPr marL="1371600" indent="0" algn="ctr">
               <a:buNone/>
-              <a:defRPr sz="2000"/>
+              <a:defRPr sz="1600"/>
             </a:lvl4pPr>
             <a:lvl5pPr marL="1828800" indent="0" algn="ctr">
               <a:buNone/>
-              <a:defRPr sz="2000"/>
+              <a:defRPr sz="1600"/>
             </a:lvl5pPr>
             <a:lvl6pPr marL="2286000" indent="0" algn="ctr">
               <a:buNone/>
-              <a:defRPr sz="2000"/>
+              <a:defRPr sz="1600"/>
             </a:lvl6pPr>
             <a:lvl7pPr marL="2743200" indent="0" algn="ctr">
               <a:buNone/>
-              <a:defRPr sz="2000"/>
+              <a:defRPr sz="1600"/>
             </a:lvl7pPr>
             <a:lvl8pPr marL="3200400" indent="0" algn="ctr">
               <a:buNone/>
-              <a:defRPr sz="2000"/>
+              <a:defRPr sz="1600"/>
             </a:lvl8pPr>
             <a:lvl9pPr marL="3657600" indent="0" algn="ctr">
               <a:buNone/>
-              <a:defRPr sz="2000"/>
+              <a:defRPr sz="1600"/>
             </a:lvl9pPr>
           </a:lstStyle>
           <a:p>
@@ -384,48 +295,10 @@
           </a:p>
         </p:txBody>
       </p:sp>
-      <p:cxnSp>
-        <p:nvCxnSpPr>
-          <p:cNvPr id="9" name="Straight Connector 8"/>
-          <p:cNvCxnSpPr/>
-          <p:nvPr/>
-        </p:nvCxnSpPr>
-        <p:spPr>
-          <a:xfrm>
-            <a:off x="1207658" y="4343400"/>
-            <a:ext cx="9875520" cy="0"/>
-          </a:xfrm>
-          <a:prstGeom prst="line">
-            <a:avLst/>
-          </a:prstGeom>
-          <a:ln w="6350">
-            <a:solidFill>
-              <a:schemeClr val="tx1">
-                <a:lumMod val="50000"/>
-                <a:lumOff val="50000"/>
-              </a:schemeClr>
-            </a:solidFill>
-          </a:ln>
-        </p:spPr>
-        <p:style>
-          <a:lnRef idx="1">
-            <a:schemeClr val="accent1"/>
-          </a:lnRef>
-          <a:fillRef idx="0">
-            <a:schemeClr val="accent1"/>
-          </a:fillRef>
-          <a:effectRef idx="0">
-            <a:schemeClr val="accent1"/>
-          </a:effectRef>
-          <a:fontRef idx="minor">
-            <a:schemeClr val="tx1"/>
-          </a:fontRef>
-        </p:style>
-      </p:cxnSp>
     </p:spTree>
     <p:extLst>
       <p:ext uri="{BB962C8B-B14F-4D97-AF65-F5344CB8AC3E}">
-        <p14:creationId xmlns:p14="http://schemas.microsoft.com/office/powerpoint/2010/main" val="2378227780"/>
+        <p14:creationId xmlns:p14="http://schemas.microsoft.com/office/powerpoint/2010/main" val="3728877472"/>
       </p:ext>
     </p:extLst>
   </p:cSld>
@@ -487,7 +360,7 @@
         </p:nvSpPr>
         <p:spPr/>
         <p:txBody>
-          <a:bodyPr vert="eaVert" lIns="45720" tIns="0" rIns="45720" bIns="0"/>
+          <a:bodyPr vert="eaVert"/>
           <a:lstStyle/>
           <a:p>
             <a:pPr lvl="0"/>
@@ -595,7 +468,7 @@
     </p:spTree>
     <p:extLst>
       <p:ext uri="{BB962C8B-B14F-4D97-AF65-F5344CB8AC3E}">
-        <p14:creationId xmlns:p14="http://schemas.microsoft.com/office/powerpoint/2010/main" val="1834886107"/>
+        <p14:creationId xmlns:p14="http://schemas.microsoft.com/office/powerpoint/2010/main" val="2593183473"/>
       </p:ext>
     </p:extLst>
   </p:cSld>
@@ -606,7 +479,7 @@
 </file>
 
 <file path=ppt/slideLayouts/slideLayout11.xml><?xml version="1.0" encoding="utf-8"?>
-<p:sldLayout xmlns:a="http://schemas.openxmlformats.org/drawingml/2006/main" xmlns:r="http://schemas.openxmlformats.org/officeDocument/2006/relationships" xmlns:p="http://schemas.openxmlformats.org/presentationml/2006/main" showMasterSp="0" type="vertTitleAndTx" preserve="1">
+<p:sldLayout xmlns:a="http://schemas.openxmlformats.org/drawingml/2006/main" xmlns:r="http://schemas.openxmlformats.org/officeDocument/2006/relationships" xmlns:p="http://schemas.openxmlformats.org/presentationml/2006/main" type="vertTitleAndTx" preserve="1">
   <p:cSld name="Vertical Title and Text">
     <p:spTree>
       <p:nvGrpSpPr>
@@ -624,126 +497,50 @@
       </p:grpSpPr>
       <p:sp>
         <p:nvSpPr>
-          <p:cNvPr id="7" name="Rectangle 6"/>
-          <p:cNvSpPr/>
-          <p:nvPr/>
+          <p:cNvPr id="2" name="Vertical Title 1"/>
+          <p:cNvSpPr>
+            <a:spLocks noGrp="1"/>
+          </p:cNvSpPr>
+          <p:nvPr>
+            <p:ph type="title" orient="vert"/>
+          </p:nvPr>
         </p:nvSpPr>
         <p:spPr>
           <a:xfrm>
-            <a:off x="3175" y="6400800"/>
-            <a:ext cx="12188825" cy="457200"/>
+            <a:off x="8724900" y="365125"/>
+            <a:ext cx="2628900" cy="5811838"/>
           </a:xfrm>
-          <a:prstGeom prst="rect">
-            <a:avLst/>
-          </a:prstGeom>
-          <a:solidFill>
-            <a:schemeClr val="accent2"/>
-          </a:solidFill>
-          <a:ln>
-            <a:noFill/>
-          </a:ln>
         </p:spPr>
-        <p:style>
-          <a:lnRef idx="2">
-            <a:schemeClr val="accent1">
-              <a:shade val="50000"/>
-            </a:schemeClr>
-          </a:lnRef>
-          <a:fillRef idx="1">
-            <a:schemeClr val="accent1"/>
-          </a:fillRef>
-          <a:effectRef idx="0">
-            <a:schemeClr val="accent1"/>
-          </a:effectRef>
-          <a:fontRef idx="minor">
-            <a:schemeClr val="lt1"/>
-          </a:fontRef>
-        </p:style>
-      </p:sp>
-      <p:sp>
-        <p:nvSpPr>
-          <p:cNvPr id="8" name="Rectangle 7"/>
-          <p:cNvSpPr/>
-          <p:nvPr/>
+        <p:txBody>
+          <a:bodyPr vert="eaVert"/>
+          <a:lstStyle/>
+          <a:p>
+            <a:r>
+              <a:rPr lang="en-US"/>
+              <a:t>Click to edit Master title style</a:t>
+            </a:r>
+            <a:endParaRPr lang="en-US" dirty="0"/>
+          </a:p>
+        </p:txBody>
+      </p:sp>
+      <p:sp>
+        <p:nvSpPr>
+          <p:cNvPr id="3" name="Vertical Text Placeholder 2"/>
+          <p:cNvSpPr>
+            <a:spLocks noGrp="1"/>
+          </p:cNvSpPr>
+          <p:nvPr>
+            <p:ph type="body" orient="vert" idx="1"/>
+          </p:nvPr>
         </p:nvSpPr>
         <p:spPr>
           <a:xfrm>
-            <a:off x="15" y="6334316"/>
-            <a:ext cx="12188825" cy="64008"/>
-          </a:xfrm>
-          <a:prstGeom prst="rect">
-            <a:avLst/>
-          </a:prstGeom>
-          <a:solidFill>
-            <a:schemeClr val="accent1"/>
-          </a:solidFill>
-          <a:ln>
-            <a:noFill/>
-          </a:ln>
-        </p:spPr>
-        <p:style>
-          <a:lnRef idx="2">
-            <a:schemeClr val="accent1">
-              <a:shade val="50000"/>
-            </a:schemeClr>
-          </a:lnRef>
-          <a:fillRef idx="1">
-            <a:schemeClr val="accent1"/>
-          </a:fillRef>
-          <a:effectRef idx="0">
-            <a:schemeClr val="accent1"/>
-          </a:effectRef>
-          <a:fontRef idx="minor">
-            <a:schemeClr val="lt1"/>
-          </a:fontRef>
-        </p:style>
-      </p:sp>
-      <p:sp>
-        <p:nvSpPr>
-          <p:cNvPr id="2" name="Vertical Title 1"/>
-          <p:cNvSpPr>
-            <a:spLocks noGrp="1"/>
-          </p:cNvSpPr>
-          <p:nvPr>
-            <p:ph type="title" orient="vert"/>
-          </p:nvPr>
-        </p:nvSpPr>
-        <p:spPr>
-          <a:xfrm>
-            <a:off x="8724900" y="414778"/>
-            <a:ext cx="2628900" cy="5757421"/>
+            <a:off x="838200" y="365125"/>
+            <a:ext cx="7734300" cy="5811838"/>
           </a:xfrm>
         </p:spPr>
         <p:txBody>
           <a:bodyPr vert="eaVert"/>
-          <a:lstStyle/>
-          <a:p>
-            <a:r>
-              <a:rPr lang="en-US"/>
-              <a:t>Click to edit Master title style</a:t>
-            </a:r>
-            <a:endParaRPr lang="en-US" dirty="0"/>
-          </a:p>
-        </p:txBody>
-      </p:sp>
-      <p:sp>
-        <p:nvSpPr>
-          <p:cNvPr id="3" name="Vertical Text Placeholder 2"/>
-          <p:cNvSpPr>
-            <a:spLocks noGrp="1"/>
-          </p:cNvSpPr>
-          <p:nvPr>
-            <p:ph type="body" orient="vert" idx="1"/>
-          </p:nvPr>
-        </p:nvSpPr>
-        <p:spPr>
-          <a:xfrm>
-            <a:off x="838200" y="414778"/>
-            <a:ext cx="7734300" cy="5757422"/>
-          </a:xfrm>
-        </p:spPr>
-        <p:txBody>
-          <a:bodyPr vert="eaVert" lIns="45720" tIns="0" rIns="45720" bIns="0"/>
           <a:lstStyle/>
           <a:p>
             <a:pPr lvl="0"/>
@@ -851,7 +648,7 @@
     </p:spTree>
     <p:extLst>
       <p:ext uri="{BB962C8B-B14F-4D97-AF65-F5344CB8AC3E}">
-        <p14:creationId xmlns:p14="http://schemas.microsoft.com/office/powerpoint/2010/main" val="321948943"/>
+        <p14:creationId xmlns:p14="http://schemas.microsoft.com/office/powerpoint/2010/main" val="602067428"/>
       </p:ext>
     </p:extLst>
   </p:cSld>
@@ -891,11 +688,7 @@
         <p:spPr/>
         <p:txBody>
           <a:bodyPr/>
-          <a:lstStyle>
-            <a:lvl1pPr marL="0">
-              <a:defRPr/>
-            </a:lvl1pPr>
-          </a:lstStyle>
+          <a:lstStyle/>
           <a:p>
             <a:r>
               <a:rPr lang="en-US"/>
@@ -1025,7 +818,7 @@
     </p:spTree>
     <p:extLst>
       <p:ext uri="{BB962C8B-B14F-4D97-AF65-F5344CB8AC3E}">
-        <p14:creationId xmlns:p14="http://schemas.microsoft.com/office/powerpoint/2010/main" val="3516331910"/>
+        <p14:creationId xmlns:p14="http://schemas.microsoft.com/office/powerpoint/2010/main" val="391297586"/>
       </p:ext>
     </p:extLst>
   </p:cSld>
@@ -1036,16 +829,8 @@
 </file>
 
 <file path=ppt/slideLayouts/slideLayout3.xml><?xml version="1.0" encoding="utf-8"?>
-<p:sldLayout xmlns:a="http://schemas.openxmlformats.org/drawingml/2006/main" xmlns:r="http://schemas.openxmlformats.org/officeDocument/2006/relationships" xmlns:p="http://schemas.openxmlformats.org/presentationml/2006/main" showMasterSp="0" type="secHead" preserve="1">
+<p:sldLayout xmlns:a="http://schemas.openxmlformats.org/drawingml/2006/main" xmlns:r="http://schemas.openxmlformats.org/officeDocument/2006/relationships" xmlns:p="http://schemas.openxmlformats.org/presentationml/2006/main" type="secHead" preserve="1">
   <p:cSld name="Section Header">
-    <p:bg>
-      <p:bgPr>
-        <a:solidFill>
-          <a:schemeClr val="bg1"/>
-        </a:solidFill>
-        <a:effectLst/>
-      </p:bgPr>
-    </p:bg>
     <p:spTree>
       <p:nvGrpSpPr>
         <p:cNvPr id="1" name=""/>
@@ -1062,157 +847,68 @@
       </p:grpSpPr>
       <p:sp>
         <p:nvSpPr>
-          <p:cNvPr id="7" name="Rectangle 6"/>
-          <p:cNvSpPr/>
-          <p:nvPr/>
+          <p:cNvPr id="2" name="Title 1"/>
+          <p:cNvSpPr>
+            <a:spLocks noGrp="1"/>
+          </p:cNvSpPr>
+          <p:nvPr>
+            <p:ph type="title"/>
+          </p:nvPr>
         </p:nvSpPr>
         <p:spPr>
           <a:xfrm>
-            <a:off x="3175" y="6400800"/>
-            <a:ext cx="12188825" cy="457200"/>
+            <a:off x="831850" y="1709738"/>
+            <a:ext cx="10515600" cy="2852737"/>
           </a:xfrm>
-          <a:prstGeom prst="rect">
-            <a:avLst/>
-          </a:prstGeom>
-          <a:solidFill>
-            <a:schemeClr val="accent2"/>
-          </a:solidFill>
-          <a:ln>
-            <a:noFill/>
-          </a:ln>
         </p:spPr>
-        <p:style>
-          <a:lnRef idx="2">
-            <a:schemeClr val="accent1">
-              <a:shade val="50000"/>
-            </a:schemeClr>
-          </a:lnRef>
-          <a:fillRef idx="1">
-            <a:schemeClr val="accent1"/>
-          </a:fillRef>
-          <a:effectRef idx="0">
-            <a:schemeClr val="accent1"/>
-          </a:effectRef>
-          <a:fontRef idx="minor">
-            <a:schemeClr val="lt1"/>
-          </a:fontRef>
-        </p:style>
-      </p:sp>
-      <p:sp>
-        <p:nvSpPr>
-          <p:cNvPr id="8" name="Rectangle 7"/>
-          <p:cNvSpPr/>
-          <p:nvPr/>
+        <p:txBody>
+          <a:bodyPr anchor="b"/>
+          <a:lstStyle>
+            <a:lvl1pPr>
+              <a:defRPr sz="6000"/>
+            </a:lvl1pPr>
+          </a:lstStyle>
+          <a:p>
+            <a:r>
+              <a:rPr lang="en-US"/>
+              <a:t>Click to edit Master title style</a:t>
+            </a:r>
+            <a:endParaRPr lang="en-US" dirty="0"/>
+          </a:p>
+        </p:txBody>
+      </p:sp>
+      <p:sp>
+        <p:nvSpPr>
+          <p:cNvPr id="3" name="Text Placeholder 2"/>
+          <p:cNvSpPr>
+            <a:spLocks noGrp="1"/>
+          </p:cNvSpPr>
+          <p:nvPr>
+            <p:ph type="body" idx="1"/>
+          </p:nvPr>
         </p:nvSpPr>
         <p:spPr>
           <a:xfrm>
-            <a:off x="15" y="6334316"/>
-            <a:ext cx="12188825" cy="64008"/>
-          </a:xfrm>
-          <a:prstGeom prst="rect">
-            <a:avLst/>
-          </a:prstGeom>
-          <a:solidFill>
-            <a:schemeClr val="accent1"/>
-          </a:solidFill>
-          <a:ln>
-            <a:noFill/>
-          </a:ln>
-        </p:spPr>
-        <p:style>
-          <a:lnRef idx="2">
-            <a:schemeClr val="accent1">
-              <a:shade val="50000"/>
-            </a:schemeClr>
-          </a:lnRef>
-          <a:fillRef idx="1">
-            <a:schemeClr val="accent1"/>
-          </a:fillRef>
-          <a:effectRef idx="0">
-            <a:schemeClr val="accent1"/>
-          </a:effectRef>
-          <a:fontRef idx="minor">
-            <a:schemeClr val="lt1"/>
-          </a:fontRef>
-        </p:style>
-      </p:sp>
-      <p:sp>
-        <p:nvSpPr>
-          <p:cNvPr id="2" name="Title 1"/>
-          <p:cNvSpPr>
-            <a:spLocks noGrp="1"/>
-          </p:cNvSpPr>
-          <p:nvPr>
-            <p:ph type="title"/>
-          </p:nvPr>
-        </p:nvSpPr>
-        <p:spPr>
-          <a:xfrm>
-            <a:off x="1097280" y="758952"/>
-            <a:ext cx="10058400" cy="3566160"/>
+            <a:off x="831850" y="4589463"/>
+            <a:ext cx="10515600" cy="1500187"/>
           </a:xfrm>
         </p:spPr>
         <p:txBody>
-          <a:bodyPr anchor="b" anchorCtr="0">
-            <a:normAutofit/>
-          </a:bodyPr>
+          <a:bodyPr/>
           <a:lstStyle>
-            <a:lvl1pPr>
-              <a:lnSpc>
-                <a:spcPct val="85000"/>
-              </a:lnSpc>
-              <a:defRPr sz="8000" b="0">
+            <a:lvl1pPr marL="0" indent="0">
+              <a:buNone/>
+              <a:defRPr sz="2400">
                 <a:solidFill>
                   <a:schemeClr val="tx1">
-                    <a:lumMod val="85000"/>
-                    <a:lumOff val="15000"/>
+                    <a:tint val="75000"/>
                   </a:schemeClr>
                 </a:solidFill>
               </a:defRPr>
             </a:lvl1pPr>
-          </a:lstStyle>
-          <a:p>
-            <a:r>
-              <a:rPr lang="en-US"/>
-              <a:t>Click to edit Master title style</a:t>
-            </a:r>
-            <a:endParaRPr lang="en-US" dirty="0"/>
-          </a:p>
-        </p:txBody>
-      </p:sp>
-      <p:sp>
-        <p:nvSpPr>
-          <p:cNvPr id="3" name="Text Placeholder 2"/>
-          <p:cNvSpPr>
-            <a:spLocks noGrp="1"/>
-          </p:cNvSpPr>
-          <p:nvPr>
-            <p:ph type="body" idx="1"/>
-          </p:nvPr>
-        </p:nvSpPr>
-        <p:spPr>
-          <a:xfrm>
-            <a:off x="1097280" y="4453128"/>
-            <a:ext cx="10058400" cy="1143000"/>
-          </a:xfrm>
-        </p:spPr>
-        <p:txBody>
-          <a:bodyPr lIns="91440" rIns="91440" anchor="t" anchorCtr="0">
-            <a:normAutofit/>
-          </a:bodyPr>
-          <a:lstStyle>
-            <a:lvl1pPr marL="0" indent="0">
-              <a:buNone/>
-              <a:defRPr sz="2400" cap="all" spc="200" baseline="0">
-                <a:solidFill>
-                  <a:schemeClr val="tx2"/>
-                </a:solidFill>
-                <a:latin typeface="+mj-lt"/>
-              </a:defRPr>
-            </a:lvl1pPr>
             <a:lvl2pPr marL="457200" indent="0">
               <a:buNone/>
-              <a:defRPr sz="1800">
+              <a:defRPr sz="2000">
                 <a:solidFill>
                   <a:schemeClr val="tx1">
                     <a:tint val="75000"/>
@@ -1222,7 +918,7 @@
             </a:lvl2pPr>
             <a:lvl3pPr marL="914400" indent="0">
               <a:buNone/>
-              <a:defRPr sz="1600">
+              <a:defRPr sz="1800">
                 <a:solidFill>
                   <a:schemeClr val="tx1">
                     <a:tint val="75000"/>
@@ -1232,7 +928,7 @@
             </a:lvl3pPr>
             <a:lvl4pPr marL="1371600" indent="0">
               <a:buNone/>
-              <a:defRPr sz="1400">
+              <a:defRPr sz="1600">
                 <a:solidFill>
                   <a:schemeClr val="tx1">
                     <a:tint val="75000"/>
@@ -1242,7 +938,7 @@
             </a:lvl4pPr>
             <a:lvl5pPr marL="1828800" indent="0">
               <a:buNone/>
-              <a:defRPr sz="1400">
+              <a:defRPr sz="1600">
                 <a:solidFill>
                   <a:schemeClr val="tx1">
                     <a:tint val="75000"/>
@@ -1252,7 +948,7 @@
             </a:lvl5pPr>
             <a:lvl6pPr marL="2286000" indent="0">
               <a:buNone/>
-              <a:defRPr sz="1400">
+              <a:defRPr sz="1600">
                 <a:solidFill>
                   <a:schemeClr val="tx1">
                     <a:tint val="75000"/>
@@ -1262,7 +958,7 @@
             </a:lvl6pPr>
             <a:lvl7pPr marL="2743200" indent="0">
               <a:buNone/>
-              <a:defRPr sz="1400">
+              <a:defRPr sz="1600">
                 <a:solidFill>
                   <a:schemeClr val="tx1">
                     <a:tint val="75000"/>
@@ -1272,7 +968,7 @@
             </a:lvl7pPr>
             <a:lvl8pPr marL="3200400" indent="0">
               <a:buNone/>
-              <a:defRPr sz="1400">
+              <a:defRPr sz="1600">
                 <a:solidFill>
                   <a:schemeClr val="tx1">
                     <a:tint val="75000"/>
@@ -1282,7 +978,7 @@
             </a:lvl8pPr>
             <a:lvl9pPr marL="3657600" indent="0">
               <a:buNone/>
-              <a:defRPr sz="1400">
+              <a:defRPr sz="1600">
                 <a:solidFill>
                   <a:schemeClr val="tx1">
                     <a:tint val="75000"/>
@@ -1365,48 +1061,10 @@
           </a:p>
         </p:txBody>
       </p:sp>
-      <p:cxnSp>
-        <p:nvCxnSpPr>
-          <p:cNvPr id="9" name="Straight Connector 8"/>
-          <p:cNvCxnSpPr/>
-          <p:nvPr/>
-        </p:nvCxnSpPr>
-        <p:spPr>
-          <a:xfrm>
-            <a:off x="1207658" y="4343400"/>
-            <a:ext cx="9875520" cy="0"/>
-          </a:xfrm>
-          <a:prstGeom prst="line">
-            <a:avLst/>
-          </a:prstGeom>
-          <a:ln w="6350">
-            <a:solidFill>
-              <a:schemeClr val="tx1">
-                <a:lumMod val="50000"/>
-                <a:lumOff val="50000"/>
-              </a:schemeClr>
-            </a:solidFill>
-          </a:ln>
-        </p:spPr>
-        <p:style>
-          <a:lnRef idx="1">
-            <a:schemeClr val="accent1"/>
-          </a:lnRef>
-          <a:fillRef idx="0">
-            <a:schemeClr val="accent1"/>
-          </a:fillRef>
-          <a:effectRef idx="0">
-            <a:schemeClr val="accent1"/>
-          </a:effectRef>
-          <a:fontRef idx="minor">
-            <a:schemeClr val="tx1"/>
-          </a:fontRef>
-        </p:style>
-      </p:cxnSp>
     </p:spTree>
     <p:extLst>
       <p:ext uri="{BB962C8B-B14F-4D97-AF65-F5344CB8AC3E}">
-        <p14:creationId xmlns:p14="http://schemas.microsoft.com/office/powerpoint/2010/main" val="3813145152"/>
+        <p14:creationId xmlns:p14="http://schemas.microsoft.com/office/powerpoint/2010/main" val="3275849045"/>
       </p:ext>
     </p:extLst>
   </p:cSld>
@@ -1435,27 +1093,79 @@
       </p:grpSpPr>
       <p:sp>
         <p:nvSpPr>
-          <p:cNvPr id="8" name="Title 7"/>
+          <p:cNvPr id="2" name="Title 1"/>
           <p:cNvSpPr>
             <a:spLocks noGrp="1"/>
           </p:cNvSpPr>
           <p:nvPr>
             <p:ph type="title"/>
+          </p:nvPr>
+        </p:nvSpPr>
+        <p:spPr/>
+        <p:txBody>
+          <a:bodyPr/>
+          <a:lstStyle/>
+          <a:p>
+            <a:r>
+              <a:rPr lang="en-US"/>
+              <a:t>Click to edit Master title style</a:t>
+            </a:r>
+            <a:endParaRPr lang="en-US" dirty="0"/>
+          </a:p>
+        </p:txBody>
+      </p:sp>
+      <p:sp>
+        <p:nvSpPr>
+          <p:cNvPr id="3" name="Content Placeholder 2"/>
+          <p:cNvSpPr>
+            <a:spLocks noGrp="1"/>
+          </p:cNvSpPr>
+          <p:nvPr>
+            <p:ph sz="half" idx="1"/>
           </p:nvPr>
         </p:nvSpPr>
         <p:spPr>
           <a:xfrm>
-            <a:off x="1097280" y="286603"/>
-            <a:ext cx="10058400" cy="1450757"/>
+            <a:off x="838200" y="1825625"/>
+            <a:ext cx="5181600" cy="4351338"/>
           </a:xfrm>
         </p:spPr>
         <p:txBody>
           <a:bodyPr/>
           <a:lstStyle/>
           <a:p>
-            <a:r>
-              <a:rPr lang="en-US"/>
-              <a:t>Click to edit Master title style</a:t>
+            <a:pPr lvl="0"/>
+            <a:r>
+              <a:rPr lang="en-US"/>
+              <a:t>Edit Master text styles</a:t>
+            </a:r>
+          </a:p>
+          <a:p>
+            <a:pPr lvl="1"/>
+            <a:r>
+              <a:rPr lang="en-US"/>
+              <a:t>Second level</a:t>
+            </a:r>
+          </a:p>
+          <a:p>
+            <a:pPr lvl="2"/>
+            <a:r>
+              <a:rPr lang="en-US"/>
+              <a:t>Third level</a:t>
+            </a:r>
+          </a:p>
+          <a:p>
+            <a:pPr lvl="3"/>
+            <a:r>
+              <a:rPr lang="en-US"/>
+              <a:t>Fourth level</a:t>
+            </a:r>
+          </a:p>
+          <a:p>
+            <a:pPr lvl="4"/>
+            <a:r>
+              <a:rPr lang="en-US"/>
+              <a:t>Fifth level</a:t>
             </a:r>
             <a:endParaRPr lang="en-US" dirty="0"/>
           </a:p>
@@ -1463,75 +1173,18 @@
       </p:sp>
       <p:sp>
         <p:nvSpPr>
-          <p:cNvPr id="3" name="Content Placeholder 2"/>
-          <p:cNvSpPr>
-            <a:spLocks noGrp="1"/>
-          </p:cNvSpPr>
-          <p:nvPr>
-            <p:ph sz="half" idx="1"/>
+          <p:cNvPr id="4" name="Content Placeholder 3"/>
+          <p:cNvSpPr>
+            <a:spLocks noGrp="1"/>
+          </p:cNvSpPr>
+          <p:nvPr>
+            <p:ph sz="half" idx="2"/>
           </p:nvPr>
         </p:nvSpPr>
         <p:spPr>
           <a:xfrm>
-            <a:off x="1097279" y="1845734"/>
-            <a:ext cx="4937760" cy="4023360"/>
-          </a:xfrm>
-        </p:spPr>
-        <p:txBody>
-          <a:bodyPr/>
-          <a:lstStyle/>
-          <a:p>
-            <a:pPr lvl="0"/>
-            <a:r>
-              <a:rPr lang="en-US"/>
-              <a:t>Edit Master text styles</a:t>
-            </a:r>
-          </a:p>
-          <a:p>
-            <a:pPr lvl="1"/>
-            <a:r>
-              <a:rPr lang="en-US"/>
-              <a:t>Second level</a:t>
-            </a:r>
-          </a:p>
-          <a:p>
-            <a:pPr lvl="2"/>
-            <a:r>
-              <a:rPr lang="en-US"/>
-              <a:t>Third level</a:t>
-            </a:r>
-          </a:p>
-          <a:p>
-            <a:pPr lvl="3"/>
-            <a:r>
-              <a:rPr lang="en-US"/>
-              <a:t>Fourth level</a:t>
-            </a:r>
-          </a:p>
-          <a:p>
-            <a:pPr lvl="4"/>
-            <a:r>
-              <a:rPr lang="en-US"/>
-              <a:t>Fifth level</a:t>
-            </a:r>
-            <a:endParaRPr lang="en-US" dirty="0"/>
-          </a:p>
-        </p:txBody>
-      </p:sp>
-      <p:sp>
-        <p:nvSpPr>
-          <p:cNvPr id="4" name="Content Placeholder 3"/>
-          <p:cNvSpPr>
-            <a:spLocks noGrp="1"/>
-          </p:cNvSpPr>
-          <p:nvPr>
-            <p:ph sz="half" idx="2"/>
-          </p:nvPr>
-        </p:nvSpPr>
-        <p:spPr>
-          <a:xfrm>
-            <a:off x="6217920" y="1845735"/>
-            <a:ext cx="4937760" cy="4023360"/>
+            <a:off x="6172200" y="1825625"/>
+            <a:ext cx="5181600" cy="4351338"/>
           </a:xfrm>
         </p:spPr>
         <p:txBody>
@@ -1643,7 +1296,7 @@
     </p:spTree>
     <p:extLst>
       <p:ext uri="{BB962C8B-B14F-4D97-AF65-F5344CB8AC3E}">
-        <p14:creationId xmlns:p14="http://schemas.microsoft.com/office/powerpoint/2010/main" val="2754580714"/>
+        <p14:creationId xmlns:p14="http://schemas.microsoft.com/office/powerpoint/2010/main" val="3953965493"/>
       </p:ext>
     </p:extLst>
   </p:cSld>
@@ -1672,7 +1325,7 @@
       </p:grpSpPr>
       <p:sp>
         <p:nvSpPr>
-          <p:cNvPr id="10" name="Title 9"/>
+          <p:cNvPr id="2" name="Title 1"/>
           <p:cNvSpPr>
             <a:spLocks noGrp="1"/>
           </p:cNvSpPr>
@@ -1682,8 +1335,8 @@
         </p:nvSpPr>
         <p:spPr>
           <a:xfrm>
-            <a:off x="1097280" y="286603"/>
-            <a:ext cx="10058400" cy="1450757"/>
+            <a:off x="839788" y="365125"/>
+            <a:ext cx="10515600" cy="1325563"/>
           </a:xfrm>
         </p:spPr>
         <p:txBody>
@@ -1710,22 +1363,16 @@
         </p:nvSpPr>
         <p:spPr>
           <a:xfrm>
-            <a:off x="1097280" y="1846052"/>
-            <a:ext cx="4937760" cy="736282"/>
+            <a:off x="839788" y="1681163"/>
+            <a:ext cx="5157787" cy="823912"/>
           </a:xfrm>
         </p:spPr>
         <p:txBody>
-          <a:bodyPr lIns="91440" rIns="91440" anchor="ctr">
-            <a:normAutofit/>
-          </a:bodyPr>
+          <a:bodyPr anchor="b"/>
           <a:lstStyle>
             <a:lvl1pPr marL="0" indent="0">
               <a:buNone/>
-              <a:defRPr sz="2000" b="0" cap="all" baseline="0">
-                <a:solidFill>
-                  <a:schemeClr val="tx2"/>
-                </a:solidFill>
-              </a:defRPr>
+              <a:defRPr sz="2400" b="1"/>
             </a:lvl1pPr>
             <a:lvl2pPr marL="457200" indent="0">
               <a:buNone/>
@@ -1781,8 +1428,8 @@
         </p:nvSpPr>
         <p:spPr>
           <a:xfrm>
-            <a:off x="1097280" y="2582334"/>
-            <a:ext cx="4937760" cy="3378200"/>
+            <a:off x="839788" y="2505075"/>
+            <a:ext cx="5157787" cy="3684588"/>
           </a:xfrm>
         </p:spPr>
         <p:txBody>
@@ -1838,22 +1485,16 @@
         </p:nvSpPr>
         <p:spPr>
           <a:xfrm>
-            <a:off x="6217920" y="1846052"/>
-            <a:ext cx="4937760" cy="736282"/>
+            <a:off x="6172200" y="1681163"/>
+            <a:ext cx="5183188" cy="823912"/>
           </a:xfrm>
         </p:spPr>
         <p:txBody>
-          <a:bodyPr lIns="91440" rIns="91440" anchor="ctr">
-            <a:normAutofit/>
-          </a:bodyPr>
+          <a:bodyPr anchor="b"/>
           <a:lstStyle>
             <a:lvl1pPr marL="0" indent="0">
               <a:buNone/>
-              <a:defRPr sz="2000" b="0" cap="all" baseline="0">
-                <a:solidFill>
-                  <a:schemeClr val="tx2"/>
-                </a:solidFill>
-              </a:defRPr>
+              <a:defRPr sz="2400" b="1"/>
             </a:lvl1pPr>
             <a:lvl2pPr marL="457200" indent="0">
               <a:buNone/>
@@ -1909,8 +1550,8 @@
         </p:nvSpPr>
         <p:spPr>
           <a:xfrm>
-            <a:off x="6217920" y="2582334"/>
-            <a:ext cx="4937760" cy="3378200"/>
+            <a:off x="6172200" y="2505075"/>
+            <a:ext cx="5183188" cy="3684588"/>
           </a:xfrm>
         </p:spPr>
         <p:txBody>
@@ -2022,7 +1663,7 @@
     </p:spTree>
     <p:extLst>
       <p:ext uri="{BB962C8B-B14F-4D97-AF65-F5344CB8AC3E}">
-        <p14:creationId xmlns:p14="http://schemas.microsoft.com/office/powerpoint/2010/main" val="3469543579"/>
+        <p14:creationId xmlns:p14="http://schemas.microsoft.com/office/powerpoint/2010/main" val="3455505550"/>
       </p:ext>
     </p:extLst>
   </p:cSld>
@@ -2140,7 +1781,7 @@
     </p:spTree>
     <p:extLst>
       <p:ext uri="{BB962C8B-B14F-4D97-AF65-F5344CB8AC3E}">
-        <p14:creationId xmlns:p14="http://schemas.microsoft.com/office/powerpoint/2010/main" val="393521267"/>
+        <p14:creationId xmlns:p14="http://schemas.microsoft.com/office/powerpoint/2010/main" val="2809396153"/>
       </p:ext>
     </p:extLst>
   </p:cSld>
@@ -2151,7 +1792,7 @@
 </file>
 
 <file path=ppt/slideLayouts/slideLayout7.xml><?xml version="1.0" encoding="utf-8"?>
-<p:sldLayout xmlns:a="http://schemas.openxmlformats.org/drawingml/2006/main" xmlns:r="http://schemas.openxmlformats.org/officeDocument/2006/relationships" xmlns:p="http://schemas.openxmlformats.org/presentationml/2006/main" showMasterSp="0" type="blank" preserve="1">
+<p:sldLayout xmlns:a="http://schemas.openxmlformats.org/drawingml/2006/main" xmlns:r="http://schemas.openxmlformats.org/officeDocument/2006/relationships" xmlns:p="http://schemas.openxmlformats.org/presentationml/2006/main" type="blank" preserve="1">
   <p:cSld name="Blank">
     <p:spTree>
       <p:nvGrpSpPr>
@@ -2169,83 +1810,7 @@
       </p:grpSpPr>
       <p:sp>
         <p:nvSpPr>
-          <p:cNvPr id="5" name="Rectangle 4"/>
-          <p:cNvSpPr/>
-          <p:nvPr/>
-        </p:nvSpPr>
-        <p:spPr>
-          <a:xfrm>
-            <a:off x="3175" y="6400800"/>
-            <a:ext cx="12188825" cy="457200"/>
-          </a:xfrm>
-          <a:prstGeom prst="rect">
-            <a:avLst/>
-          </a:prstGeom>
-          <a:solidFill>
-            <a:schemeClr val="accent2"/>
-          </a:solidFill>
-          <a:ln>
-            <a:noFill/>
-          </a:ln>
-        </p:spPr>
-        <p:style>
-          <a:lnRef idx="2">
-            <a:schemeClr val="accent1">
-              <a:shade val="50000"/>
-            </a:schemeClr>
-          </a:lnRef>
-          <a:fillRef idx="1">
-            <a:schemeClr val="accent1"/>
-          </a:fillRef>
-          <a:effectRef idx="0">
-            <a:schemeClr val="accent1"/>
-          </a:effectRef>
-          <a:fontRef idx="minor">
-            <a:schemeClr val="lt1"/>
-          </a:fontRef>
-        </p:style>
-      </p:sp>
-      <p:sp>
-        <p:nvSpPr>
-          <p:cNvPr id="6" name="Rectangle 5"/>
-          <p:cNvSpPr/>
-          <p:nvPr/>
-        </p:nvSpPr>
-        <p:spPr>
-          <a:xfrm>
-            <a:off x="15" y="6334316"/>
-            <a:ext cx="12188825" cy="64008"/>
-          </a:xfrm>
-          <a:prstGeom prst="rect">
-            <a:avLst/>
-          </a:prstGeom>
-          <a:solidFill>
-            <a:schemeClr val="accent1"/>
-          </a:solidFill>
-          <a:ln>
-            <a:noFill/>
-          </a:ln>
-        </p:spPr>
-        <p:style>
-          <a:lnRef idx="2">
-            <a:schemeClr val="accent1">
-              <a:shade val="50000"/>
-            </a:schemeClr>
-          </a:lnRef>
-          <a:fillRef idx="1">
-            <a:schemeClr val="accent1"/>
-          </a:fillRef>
-          <a:effectRef idx="0">
-            <a:schemeClr val="accent1"/>
-          </a:effectRef>
-          <a:fontRef idx="minor">
-            <a:schemeClr val="lt1"/>
-          </a:fontRef>
-        </p:style>
-      </p:sp>
-      <p:sp>
-        <p:nvSpPr>
-          <p:cNvPr id="7" name="Date Placeholder 6"/>
+          <p:cNvPr id="2" name="Date Placeholder 1"/>
           <p:cNvSpPr>
             <a:spLocks noGrp="1"/>
           </p:cNvSpPr>
@@ -2268,7 +1833,7 @@
       </p:sp>
       <p:sp>
         <p:nvSpPr>
-          <p:cNvPr id="8" name="Footer Placeholder 7"/>
+          <p:cNvPr id="3" name="Footer Placeholder 2"/>
           <p:cNvSpPr>
             <a:spLocks noGrp="1"/>
           </p:cNvSpPr>
@@ -2279,15 +1844,7 @@
         <p:spPr/>
         <p:txBody>
           <a:bodyPr/>
-          <a:lstStyle>
-            <a:lvl1pPr>
-              <a:defRPr>
-                <a:solidFill>
-                  <a:srgbClr val="FFFFFF"/>
-                </a:solidFill>
-              </a:defRPr>
-            </a:lvl1pPr>
-          </a:lstStyle>
+          <a:lstStyle/>
           <a:p>
             <a:endParaRPr lang="en-US"/>
           </a:p>
@@ -2295,7 +1852,7 @@
       </p:sp>
       <p:sp>
         <p:nvSpPr>
-          <p:cNvPr id="9" name="Slide Number Placeholder 8"/>
+          <p:cNvPr id="4" name="Slide Number Placeholder 3"/>
           <p:cNvSpPr>
             <a:spLocks noGrp="1"/>
           </p:cNvSpPr>
@@ -2319,7 +1876,7 @@
     </p:spTree>
     <p:extLst>
       <p:ext uri="{BB962C8B-B14F-4D97-AF65-F5344CB8AC3E}">
-        <p14:creationId xmlns:p14="http://schemas.microsoft.com/office/powerpoint/2010/main" val="2958371820"/>
+        <p14:creationId xmlns:p14="http://schemas.microsoft.com/office/powerpoint/2010/main" val="320809202"/>
       </p:ext>
     </p:extLst>
   </p:cSld>
@@ -2330,7 +1887,7 @@
 </file>
 
 <file path=ppt/slideLayouts/slideLayout8.xml><?xml version="1.0" encoding="utf-8"?>
-<p:sldLayout xmlns:a="http://schemas.openxmlformats.org/drawingml/2006/main" xmlns:r="http://schemas.openxmlformats.org/officeDocument/2006/relationships" xmlns:p="http://schemas.openxmlformats.org/presentationml/2006/main" showMasterSp="0" type="objTx" preserve="1">
+<p:sldLayout xmlns:a="http://schemas.openxmlformats.org/drawingml/2006/main" xmlns:r="http://schemas.openxmlformats.org/officeDocument/2006/relationships" xmlns:p="http://schemas.openxmlformats.org/presentationml/2006/main" type="objTx" preserve="1">
   <p:cSld name="Content with Caption">
     <p:spTree>
       <p:nvGrpSpPr>
@@ -2348,235 +1905,175 @@
       </p:grpSpPr>
       <p:sp>
         <p:nvSpPr>
-          <p:cNvPr id="8" name="Rectangle 7"/>
-          <p:cNvSpPr/>
-          <p:nvPr/>
+          <p:cNvPr id="2" name="Title 1"/>
+          <p:cNvSpPr>
+            <a:spLocks noGrp="1"/>
+          </p:cNvSpPr>
+          <p:nvPr>
+            <p:ph type="title"/>
+          </p:nvPr>
         </p:nvSpPr>
         <p:spPr>
           <a:xfrm>
-            <a:off x="16" y="0"/>
-            <a:ext cx="4050791" cy="6858000"/>
+            <a:off x="839788" y="457200"/>
+            <a:ext cx="3932237" cy="1600200"/>
           </a:xfrm>
-          <a:prstGeom prst="rect">
-            <a:avLst/>
-          </a:prstGeom>
-          <a:solidFill>
-            <a:schemeClr val="accent2"/>
-          </a:solidFill>
-          <a:ln>
-            <a:noFill/>
-          </a:ln>
         </p:spPr>
-        <p:style>
-          <a:lnRef idx="2">
-            <a:schemeClr val="accent1">
-              <a:shade val="50000"/>
-            </a:schemeClr>
-          </a:lnRef>
-          <a:fillRef idx="1">
-            <a:schemeClr val="accent1"/>
-          </a:fillRef>
-          <a:effectRef idx="0">
-            <a:schemeClr val="accent1"/>
-          </a:effectRef>
-          <a:fontRef idx="minor">
-            <a:schemeClr val="lt1"/>
-          </a:fontRef>
-        </p:style>
-      </p:sp>
-      <p:sp>
-        <p:nvSpPr>
-          <p:cNvPr id="9" name="Rectangle 8"/>
-          <p:cNvSpPr/>
-          <p:nvPr/>
+        <p:txBody>
+          <a:bodyPr anchor="b"/>
+          <a:lstStyle>
+            <a:lvl1pPr>
+              <a:defRPr sz="3200"/>
+            </a:lvl1pPr>
+          </a:lstStyle>
+          <a:p>
+            <a:r>
+              <a:rPr lang="en-US"/>
+              <a:t>Click to edit Master title style</a:t>
+            </a:r>
+            <a:endParaRPr lang="en-US" dirty="0"/>
+          </a:p>
+        </p:txBody>
+      </p:sp>
+      <p:sp>
+        <p:nvSpPr>
+          <p:cNvPr id="3" name="Content Placeholder 2"/>
+          <p:cNvSpPr>
+            <a:spLocks noGrp="1"/>
+          </p:cNvSpPr>
+          <p:nvPr>
+            <p:ph idx="1"/>
+          </p:nvPr>
         </p:nvSpPr>
         <p:spPr>
           <a:xfrm>
-            <a:off x="4040071" y="0"/>
-            <a:ext cx="64008" cy="6858000"/>
+            <a:off x="5183188" y="987425"/>
+            <a:ext cx="6172200" cy="4873625"/>
           </a:xfrm>
-          <a:prstGeom prst="rect">
-            <a:avLst/>
-          </a:prstGeom>
-          <a:solidFill>
-            <a:schemeClr val="accent1"/>
-          </a:solidFill>
-          <a:ln>
-            <a:noFill/>
-          </a:ln>
         </p:spPr>
-        <p:style>
-          <a:lnRef idx="2">
-            <a:schemeClr val="accent1">
-              <a:shade val="50000"/>
-            </a:schemeClr>
-          </a:lnRef>
-          <a:fillRef idx="1">
-            <a:schemeClr val="accent1"/>
-          </a:fillRef>
-          <a:effectRef idx="0">
-            <a:schemeClr val="accent1"/>
-          </a:effectRef>
-          <a:fontRef idx="minor">
-            <a:schemeClr val="lt1"/>
-          </a:fontRef>
-        </p:style>
-      </p:sp>
-      <p:sp>
-        <p:nvSpPr>
-          <p:cNvPr id="2" name="Title 1"/>
-          <p:cNvSpPr>
-            <a:spLocks noGrp="1"/>
-          </p:cNvSpPr>
-          <p:nvPr>
-            <p:ph type="title"/>
+        <p:txBody>
+          <a:bodyPr/>
+          <a:lstStyle>
+            <a:lvl1pPr>
+              <a:defRPr sz="3200"/>
+            </a:lvl1pPr>
+            <a:lvl2pPr>
+              <a:defRPr sz="2800"/>
+            </a:lvl2pPr>
+            <a:lvl3pPr>
+              <a:defRPr sz="2400"/>
+            </a:lvl3pPr>
+            <a:lvl4pPr>
+              <a:defRPr sz="2000"/>
+            </a:lvl4pPr>
+            <a:lvl5pPr>
+              <a:defRPr sz="2000"/>
+            </a:lvl5pPr>
+            <a:lvl6pPr>
+              <a:defRPr sz="2000"/>
+            </a:lvl6pPr>
+            <a:lvl7pPr>
+              <a:defRPr sz="2000"/>
+            </a:lvl7pPr>
+            <a:lvl8pPr>
+              <a:defRPr sz="2000"/>
+            </a:lvl8pPr>
+            <a:lvl9pPr>
+              <a:defRPr sz="2000"/>
+            </a:lvl9pPr>
+          </a:lstStyle>
+          <a:p>
+            <a:pPr lvl="0"/>
+            <a:r>
+              <a:rPr lang="en-US"/>
+              <a:t>Edit Master text styles</a:t>
+            </a:r>
+          </a:p>
+          <a:p>
+            <a:pPr lvl="1"/>
+            <a:r>
+              <a:rPr lang="en-US"/>
+              <a:t>Second level</a:t>
+            </a:r>
+          </a:p>
+          <a:p>
+            <a:pPr lvl="2"/>
+            <a:r>
+              <a:rPr lang="en-US"/>
+              <a:t>Third level</a:t>
+            </a:r>
+          </a:p>
+          <a:p>
+            <a:pPr lvl="3"/>
+            <a:r>
+              <a:rPr lang="en-US"/>
+              <a:t>Fourth level</a:t>
+            </a:r>
+          </a:p>
+          <a:p>
+            <a:pPr lvl="4"/>
+            <a:r>
+              <a:rPr lang="en-US"/>
+              <a:t>Fifth level</a:t>
+            </a:r>
+            <a:endParaRPr lang="en-US" dirty="0"/>
+          </a:p>
+        </p:txBody>
+      </p:sp>
+      <p:sp>
+        <p:nvSpPr>
+          <p:cNvPr id="4" name="Text Placeholder 3"/>
+          <p:cNvSpPr>
+            <a:spLocks noGrp="1"/>
+          </p:cNvSpPr>
+          <p:nvPr>
+            <p:ph type="body" sz="half" idx="2"/>
           </p:nvPr>
         </p:nvSpPr>
         <p:spPr>
           <a:xfrm>
-            <a:off x="457200" y="594359"/>
-            <a:ext cx="3200400" cy="2286000"/>
+            <a:off x="839788" y="2057400"/>
+            <a:ext cx="3932237" cy="3811588"/>
           </a:xfrm>
         </p:spPr>
         <p:txBody>
-          <a:bodyPr anchor="b">
-            <a:normAutofit/>
-          </a:bodyPr>
-          <a:lstStyle>
-            <a:lvl1pPr>
-              <a:defRPr sz="3600" b="0">
-                <a:solidFill>
-                  <a:srgbClr val="FFFFFF"/>
-                </a:solidFill>
-              </a:defRPr>
-            </a:lvl1pPr>
-          </a:lstStyle>
-          <a:p>
-            <a:r>
-              <a:rPr lang="en-US"/>
-              <a:t>Click to edit Master title style</a:t>
-            </a:r>
-            <a:endParaRPr lang="en-US" dirty="0"/>
-          </a:p>
-        </p:txBody>
-      </p:sp>
-      <p:sp>
-        <p:nvSpPr>
-          <p:cNvPr id="3" name="Content Placeholder 2"/>
-          <p:cNvSpPr>
-            <a:spLocks noGrp="1"/>
-          </p:cNvSpPr>
-          <p:nvPr>
-            <p:ph idx="1"/>
-          </p:nvPr>
-        </p:nvSpPr>
-        <p:spPr>
-          <a:xfrm>
-            <a:off x="4800600" y="731520"/>
-            <a:ext cx="6492240" cy="5257800"/>
-          </a:xfrm>
-        </p:spPr>
-        <p:txBody>
-          <a:bodyPr/>
-          <a:lstStyle/>
-          <a:p>
-            <a:pPr lvl="0"/>
-            <a:r>
-              <a:rPr lang="en-US"/>
-              <a:t>Edit Master text styles</a:t>
-            </a:r>
-          </a:p>
-          <a:p>
-            <a:pPr lvl="1"/>
-            <a:r>
-              <a:rPr lang="en-US"/>
-              <a:t>Second level</a:t>
-            </a:r>
-          </a:p>
-          <a:p>
-            <a:pPr lvl="2"/>
-            <a:r>
-              <a:rPr lang="en-US"/>
-              <a:t>Third level</a:t>
-            </a:r>
-          </a:p>
-          <a:p>
-            <a:pPr lvl="3"/>
-            <a:r>
-              <a:rPr lang="en-US"/>
-              <a:t>Fourth level</a:t>
-            </a:r>
-          </a:p>
-          <a:p>
-            <a:pPr lvl="4"/>
-            <a:r>
-              <a:rPr lang="en-US"/>
-              <a:t>Fifth level</a:t>
-            </a:r>
-            <a:endParaRPr lang="en-US" dirty="0"/>
-          </a:p>
-        </p:txBody>
-      </p:sp>
-      <p:sp>
-        <p:nvSpPr>
-          <p:cNvPr id="4" name="Text Placeholder 3"/>
-          <p:cNvSpPr>
-            <a:spLocks noGrp="1"/>
-          </p:cNvSpPr>
-          <p:nvPr>
-            <p:ph type="body" sz="half" idx="2"/>
-          </p:nvPr>
-        </p:nvSpPr>
-        <p:spPr>
-          <a:xfrm>
-            <a:off x="457200" y="2926080"/>
-            <a:ext cx="3200400" cy="3379124"/>
-          </a:xfrm>
-        </p:spPr>
-        <p:txBody>
-          <a:bodyPr lIns="91440" rIns="91440">
-            <a:normAutofit/>
-          </a:bodyPr>
+          <a:bodyPr/>
           <a:lstStyle>
             <a:lvl1pPr marL="0" indent="0">
               <a:buNone/>
-              <a:defRPr sz="1500">
-                <a:solidFill>
-                  <a:srgbClr val="FFFFFF"/>
-                </a:solidFill>
-              </a:defRPr>
+              <a:defRPr sz="1600"/>
             </a:lvl1pPr>
             <a:lvl2pPr marL="457200" indent="0">
               <a:buNone/>
-              <a:defRPr sz="1200"/>
+              <a:defRPr sz="1400"/>
             </a:lvl2pPr>
             <a:lvl3pPr marL="914400" indent="0">
               <a:buNone/>
-              <a:defRPr sz="1000"/>
+              <a:defRPr sz="1200"/>
             </a:lvl3pPr>
             <a:lvl4pPr marL="1371600" indent="0">
               <a:buNone/>
-              <a:defRPr sz="900"/>
+              <a:defRPr sz="1000"/>
             </a:lvl4pPr>
             <a:lvl5pPr marL="1828800" indent="0">
               <a:buNone/>
-              <a:defRPr sz="900"/>
+              <a:defRPr sz="1000"/>
             </a:lvl5pPr>
             <a:lvl6pPr marL="2286000" indent="0">
               <a:buNone/>
-              <a:defRPr sz="900"/>
+              <a:defRPr sz="1000"/>
             </a:lvl6pPr>
             <a:lvl7pPr marL="2743200" indent="0">
               <a:buNone/>
-              <a:defRPr sz="900"/>
+              <a:defRPr sz="1000"/>
             </a:lvl7pPr>
             <a:lvl8pPr marL="3200400" indent="0">
               <a:buNone/>
-              <a:defRPr sz="900"/>
+              <a:defRPr sz="1000"/>
             </a:lvl8pPr>
             <a:lvl9pPr marL="3657600" indent="0">
               <a:buNone/>
-              <a:defRPr sz="900"/>
+              <a:defRPr sz="1000"/>
             </a:lvl9pPr>
           </a:lstStyle>
           <a:p>
@@ -2598,19 +2095,10 @@
             <p:ph type="dt" sz="half" idx="10"/>
           </p:nvPr>
         </p:nvSpPr>
-        <p:spPr>
-          <a:xfrm>
-            <a:off x="465512" y="6459785"/>
-            <a:ext cx="2618510" cy="365125"/>
-          </a:xfrm>
-        </p:spPr>
-        <p:txBody>
-          <a:bodyPr/>
-          <a:lstStyle>
-            <a:lvl1pPr algn="l">
-              <a:defRPr/>
-            </a:lvl1pPr>
-          </a:lstStyle>
+        <p:spPr/>
+        <p:txBody>
+          <a:bodyPr/>
+          <a:lstStyle/>
           <a:p>
             <a:fld id="{45B9850D-ED44-4FC6-A08D-E5F61A487008}" type="datetimeFigureOut">
               <a:rPr lang="en-US" smtClean="0"/>
@@ -2630,23 +2118,10 @@
             <p:ph type="ftr" sz="quarter" idx="11"/>
           </p:nvPr>
         </p:nvSpPr>
-        <p:spPr>
-          <a:xfrm>
-            <a:off x="4800600" y="6459785"/>
-            <a:ext cx="4648200" cy="365125"/>
-          </a:xfrm>
-        </p:spPr>
-        <p:txBody>
-          <a:bodyPr/>
-          <a:lstStyle>
-            <a:lvl1pPr algn="l">
-              <a:defRPr>
-                <a:solidFill>
-                  <a:schemeClr val="tx2"/>
-                </a:solidFill>
-              </a:defRPr>
-            </a:lvl1pPr>
-          </a:lstStyle>
+        <p:spPr/>
+        <p:txBody>
+          <a:bodyPr/>
+          <a:lstStyle/>
           <a:p>
             <a:endParaRPr lang="en-US"/>
           </a:p>
@@ -2665,15 +2140,7 @@
         <p:spPr/>
         <p:txBody>
           <a:bodyPr/>
-          <a:lstStyle>
-            <a:lvl1pPr>
-              <a:defRPr>
-                <a:solidFill>
-                  <a:schemeClr val="tx2"/>
-                </a:solidFill>
-              </a:defRPr>
-            </a:lvl1pPr>
-          </a:lstStyle>
+          <a:lstStyle/>
           <a:p>
             <a:fld id="{484B74B5-0C33-488E-9313-9DD9199AAFEC}" type="slidenum">
               <a:rPr lang="en-US" smtClean="0"/>
@@ -2686,7 +2153,7 @@
     </p:spTree>
     <p:extLst>
       <p:ext uri="{BB962C8B-B14F-4D97-AF65-F5344CB8AC3E}">
-        <p14:creationId xmlns:p14="http://schemas.microsoft.com/office/powerpoint/2010/main" val="1090795761"/>
+        <p14:creationId xmlns:p14="http://schemas.microsoft.com/office/powerpoint/2010/main" val="2786328993"/>
       </p:ext>
     </p:extLst>
   </p:cSld>
@@ -2697,7 +2164,7 @@
 </file>
 
 <file path=ppt/slideLayouts/slideLayout9.xml><?xml version="1.0" encoding="utf-8"?>
-<p:sldLayout xmlns:a="http://schemas.openxmlformats.org/drawingml/2006/main" xmlns:r="http://schemas.openxmlformats.org/officeDocument/2006/relationships" xmlns:p="http://schemas.openxmlformats.org/presentationml/2006/main" showMasterSp="0" type="picTx" preserve="1">
+<p:sldLayout xmlns:a="http://schemas.openxmlformats.org/drawingml/2006/main" xmlns:r="http://schemas.openxmlformats.org/officeDocument/2006/relationships" xmlns:p="http://schemas.openxmlformats.org/presentationml/2006/main" type="picTx" preserve="1">
   <p:cSld name="Picture with Caption">
     <p:spTree>
       <p:nvGrpSpPr>
@@ -2715,150 +2182,58 @@
       </p:grpSpPr>
       <p:sp>
         <p:nvSpPr>
-          <p:cNvPr id="8" name="Rectangle 7"/>
-          <p:cNvSpPr/>
-          <p:nvPr/>
+          <p:cNvPr id="2" name="Title 1"/>
+          <p:cNvSpPr>
+            <a:spLocks noGrp="1"/>
+          </p:cNvSpPr>
+          <p:nvPr>
+            <p:ph type="title"/>
+          </p:nvPr>
         </p:nvSpPr>
         <p:spPr>
           <a:xfrm>
-            <a:off x="0" y="4953000"/>
-            <a:ext cx="12188825" cy="1905000"/>
+            <a:off x="839788" y="457200"/>
+            <a:ext cx="3932237" cy="1600200"/>
           </a:xfrm>
-          <a:prstGeom prst="rect">
-            <a:avLst/>
-          </a:prstGeom>
-          <a:solidFill>
-            <a:schemeClr val="accent2"/>
-          </a:solidFill>
-          <a:ln>
-            <a:noFill/>
-          </a:ln>
         </p:spPr>
-        <p:style>
-          <a:lnRef idx="2">
-            <a:schemeClr val="accent1">
-              <a:shade val="50000"/>
-            </a:schemeClr>
-          </a:lnRef>
-          <a:fillRef idx="1">
-            <a:schemeClr val="accent1"/>
-          </a:fillRef>
-          <a:effectRef idx="0">
-            <a:schemeClr val="accent1"/>
-          </a:effectRef>
-          <a:fontRef idx="minor">
-            <a:schemeClr val="lt1"/>
-          </a:fontRef>
-        </p:style>
-      </p:sp>
-      <p:sp>
-        <p:nvSpPr>
-          <p:cNvPr id="9" name="Rectangle 8"/>
-          <p:cNvSpPr/>
-          <p:nvPr/>
+        <p:txBody>
+          <a:bodyPr anchor="b"/>
+          <a:lstStyle>
+            <a:lvl1pPr>
+              <a:defRPr sz="3200"/>
+            </a:lvl1pPr>
+          </a:lstStyle>
+          <a:p>
+            <a:r>
+              <a:rPr lang="en-US"/>
+              <a:t>Click to edit Master title style</a:t>
+            </a:r>
+            <a:endParaRPr lang="en-US" dirty="0"/>
+          </a:p>
+        </p:txBody>
+      </p:sp>
+      <p:sp>
+        <p:nvSpPr>
+          <p:cNvPr id="3" name="Picture Placeholder 2"/>
+          <p:cNvSpPr>
+            <a:spLocks noGrp="1" noChangeAspect="1"/>
+          </p:cNvSpPr>
+          <p:nvPr>
+            <p:ph type="pic" idx="1"/>
+          </p:nvPr>
         </p:nvSpPr>
         <p:spPr>
           <a:xfrm>
-            <a:off x="15" y="4915076"/>
-            <a:ext cx="12188825" cy="64008"/>
-          </a:xfrm>
-          <a:prstGeom prst="rect">
-            <a:avLst/>
-          </a:prstGeom>
-          <a:solidFill>
-            <a:schemeClr val="accent1"/>
-          </a:solidFill>
-          <a:ln>
-            <a:noFill/>
-          </a:ln>
-        </p:spPr>
-        <p:style>
-          <a:lnRef idx="2">
-            <a:schemeClr val="accent1">
-              <a:shade val="50000"/>
-            </a:schemeClr>
-          </a:lnRef>
-          <a:fillRef idx="1">
-            <a:schemeClr val="accent1"/>
-          </a:fillRef>
-          <a:effectRef idx="0">
-            <a:schemeClr val="accent1"/>
-          </a:effectRef>
-          <a:fontRef idx="minor">
-            <a:schemeClr val="lt1"/>
-          </a:fontRef>
-        </p:style>
-      </p:sp>
-      <p:sp>
-        <p:nvSpPr>
-          <p:cNvPr id="2" name="Title 1"/>
-          <p:cNvSpPr>
-            <a:spLocks noGrp="1"/>
-          </p:cNvSpPr>
-          <p:nvPr>
-            <p:ph type="title"/>
-          </p:nvPr>
-        </p:nvSpPr>
-        <p:spPr>
-          <a:xfrm>
-            <a:off x="1097280" y="5074920"/>
-            <a:ext cx="10113264" cy="822960"/>
+            <a:off x="5183188" y="987425"/>
+            <a:ext cx="6172200" cy="4873625"/>
           </a:xfrm>
         </p:spPr>
         <p:txBody>
-          <a:bodyPr lIns="91440" tIns="0" rIns="91440" bIns="0" anchor="b">
-            <a:noAutofit/>
-          </a:bodyPr>
-          <a:lstStyle>
-            <a:lvl1pPr>
-              <a:defRPr sz="3600" b="0">
-                <a:solidFill>
-                  <a:srgbClr val="FFFFFF"/>
-                </a:solidFill>
-              </a:defRPr>
-            </a:lvl1pPr>
-          </a:lstStyle>
-          <a:p>
-            <a:r>
-              <a:rPr lang="en-US"/>
-              <a:t>Click to edit Master title style</a:t>
-            </a:r>
-            <a:endParaRPr lang="en-US" dirty="0"/>
-          </a:p>
-        </p:txBody>
-      </p:sp>
-      <p:sp>
-        <p:nvSpPr>
-          <p:cNvPr id="3" name="Picture Placeholder 2"/>
-          <p:cNvSpPr>
-            <a:spLocks noGrp="1" noChangeAspect="1"/>
-          </p:cNvSpPr>
-          <p:nvPr>
-            <p:ph type="pic" idx="1"/>
-          </p:nvPr>
-        </p:nvSpPr>
-        <p:spPr>
-          <a:xfrm>
-            <a:off x="15" y="0"/>
-            <a:ext cx="12191985" cy="4915076"/>
-          </a:xfrm>
-          <a:blipFill>
-            <a:blip r:embed="rId2"/>
-            <a:stretch>
-              <a:fillRect/>
-            </a:stretch>
-          </a:blipFill>
-        </p:spPr>
-        <p:txBody>
-          <a:bodyPr lIns="457200" tIns="457200" anchor="t"/>
+          <a:bodyPr anchor="t"/>
           <a:lstStyle>
             <a:lvl1pPr marL="0" indent="0">
               <a:buNone/>
-              <a:defRPr sz="3200">
-                <a:solidFill>
-                  <a:schemeClr val="bg1"/>
-                </a:solidFill>
-              </a:defRPr>
+              <a:defRPr sz="3200"/>
             </a:lvl1pPr>
             <a:lvl2pPr marL="457200" indent="0">
               <a:buNone/>
@@ -2914,60 +2289,48 @@
         </p:nvSpPr>
         <p:spPr>
           <a:xfrm>
-            <a:off x="1097280" y="5907023"/>
-            <a:ext cx="10113264" cy="594360"/>
+            <a:off x="839788" y="2057400"/>
+            <a:ext cx="3932237" cy="3811588"/>
           </a:xfrm>
         </p:spPr>
         <p:txBody>
-          <a:bodyPr lIns="91440" tIns="0" rIns="91440" bIns="0">
-            <a:normAutofit/>
-          </a:bodyPr>
+          <a:bodyPr/>
           <a:lstStyle>
             <a:lvl1pPr marL="0" indent="0">
-              <a:spcBef>
-                <a:spcPts val="0"/>
-              </a:spcBef>
-              <a:spcAft>
-                <a:spcPts val="600"/>
-              </a:spcAft>
-              <a:buNone/>
-              <a:defRPr sz="1500">
-                <a:solidFill>
-                  <a:srgbClr val="FFFFFF"/>
-                </a:solidFill>
-              </a:defRPr>
+              <a:buNone/>
+              <a:defRPr sz="1600"/>
             </a:lvl1pPr>
             <a:lvl2pPr marL="457200" indent="0">
               <a:buNone/>
-              <a:defRPr sz="1200"/>
+              <a:defRPr sz="1400"/>
             </a:lvl2pPr>
             <a:lvl3pPr marL="914400" indent="0">
               <a:buNone/>
-              <a:defRPr sz="1000"/>
+              <a:defRPr sz="1200"/>
             </a:lvl3pPr>
             <a:lvl4pPr marL="1371600" indent="0">
               <a:buNone/>
-              <a:defRPr sz="900"/>
+              <a:defRPr sz="1000"/>
             </a:lvl4pPr>
             <a:lvl5pPr marL="1828800" indent="0">
               <a:buNone/>
-              <a:defRPr sz="900"/>
+              <a:defRPr sz="1000"/>
             </a:lvl5pPr>
             <a:lvl6pPr marL="2286000" indent="0">
               <a:buNone/>
-              <a:defRPr sz="900"/>
+              <a:defRPr sz="1000"/>
             </a:lvl6pPr>
             <a:lvl7pPr marL="2743200" indent="0">
               <a:buNone/>
-              <a:defRPr sz="900"/>
+              <a:defRPr sz="1000"/>
             </a:lvl7pPr>
             <a:lvl8pPr marL="3200400" indent="0">
               <a:buNone/>
-              <a:defRPr sz="900"/>
+              <a:defRPr sz="1000"/>
             </a:lvl8pPr>
             <a:lvl9pPr marL="3657600" indent="0">
               <a:buNone/>
-              <a:defRPr sz="900"/>
+              <a:defRPr sz="1000"/>
             </a:lvl9pPr>
           </a:lstStyle>
           <a:p>
@@ -3047,7 +2410,7 @@
     </p:spTree>
     <p:extLst>
       <p:ext uri="{BB962C8B-B14F-4D97-AF65-F5344CB8AC3E}">
-        <p14:creationId xmlns:p14="http://schemas.microsoft.com/office/powerpoint/2010/main" val="345593071"/>
+        <p14:creationId xmlns:p14="http://schemas.microsoft.com/office/powerpoint/2010/main" val="3603234518"/>
       </p:ext>
     </p:extLst>
   </p:cSld>
@@ -3081,101 +2444,25 @@
       </p:grpSpPr>
       <p:sp>
         <p:nvSpPr>
-          <p:cNvPr id="7" name="Rectangle 6"/>
-          <p:cNvSpPr/>
-          <p:nvPr/>
+          <p:cNvPr id="2" name="Title Placeholder 1"/>
+          <p:cNvSpPr>
+            <a:spLocks noGrp="1"/>
+          </p:cNvSpPr>
+          <p:nvPr>
+            <p:ph type="title"/>
+          </p:nvPr>
         </p:nvSpPr>
         <p:spPr>
           <a:xfrm>
-            <a:off x="1" y="6400800"/>
-            <a:ext cx="12192000" cy="457200"/>
-          </a:xfrm>
-          <a:prstGeom prst="rect">
-            <a:avLst/>
-          </a:prstGeom>
-          <a:solidFill>
-            <a:schemeClr val="accent2"/>
-          </a:solidFill>
-          <a:ln>
-            <a:noFill/>
-          </a:ln>
-        </p:spPr>
-        <p:style>
-          <a:lnRef idx="2">
-            <a:schemeClr val="accent1">
-              <a:shade val="50000"/>
-            </a:schemeClr>
-          </a:lnRef>
-          <a:fillRef idx="1">
-            <a:schemeClr val="accent1"/>
-          </a:fillRef>
-          <a:effectRef idx="0">
-            <a:schemeClr val="accent1"/>
-          </a:effectRef>
-          <a:fontRef idx="minor">
-            <a:schemeClr val="lt1"/>
-          </a:fontRef>
-        </p:style>
-      </p:sp>
-      <p:sp>
-        <p:nvSpPr>
-          <p:cNvPr id="9" name="Rectangle 8"/>
-          <p:cNvSpPr/>
-          <p:nvPr/>
-        </p:nvSpPr>
-        <p:spPr>
-          <a:xfrm>
-            <a:off x="0" y="6334316"/>
-            <a:ext cx="12192001" cy="65998"/>
-          </a:xfrm>
-          <a:prstGeom prst="rect">
-            <a:avLst/>
-          </a:prstGeom>
-          <a:solidFill>
-            <a:schemeClr val="accent1"/>
-          </a:solidFill>
-          <a:ln>
-            <a:noFill/>
-          </a:ln>
-        </p:spPr>
-        <p:style>
-          <a:lnRef idx="2">
-            <a:schemeClr val="accent1">
-              <a:shade val="50000"/>
-            </a:schemeClr>
-          </a:lnRef>
-          <a:fillRef idx="1">
-            <a:schemeClr val="accent1"/>
-          </a:fillRef>
-          <a:effectRef idx="0">
-            <a:schemeClr val="accent1"/>
-          </a:effectRef>
-          <a:fontRef idx="minor">
-            <a:schemeClr val="lt1"/>
-          </a:fontRef>
-        </p:style>
-      </p:sp>
-      <p:sp>
-        <p:nvSpPr>
-          <p:cNvPr id="2" name="Title Placeholder 1"/>
-          <p:cNvSpPr>
-            <a:spLocks noGrp="1"/>
-          </p:cNvSpPr>
-          <p:nvPr>
-            <p:ph type="title"/>
-          </p:nvPr>
-        </p:nvSpPr>
-        <p:spPr>
-          <a:xfrm>
-            <a:off x="1097280" y="286603"/>
-            <a:ext cx="10058400" cy="1450757"/>
+            <a:off x="838200" y="365125"/>
+            <a:ext cx="10515600" cy="1325563"/>
           </a:xfrm>
           <a:prstGeom prst="rect">
             <a:avLst/>
           </a:prstGeom>
         </p:spPr>
         <p:txBody>
-          <a:bodyPr vert="horz" lIns="91440" tIns="45720" rIns="91440" bIns="45720" rtlCol="0" anchor="b">
+          <a:bodyPr vert="horz" lIns="91440" tIns="45720" rIns="91440" bIns="45720" rtlCol="0" anchor="ctr">
             <a:normAutofit/>
           </a:bodyPr>
           <a:lstStyle/>
@@ -3200,15 +2487,15 @@
         </p:nvSpPr>
         <p:spPr>
           <a:xfrm>
-            <a:off x="1097280" y="1845734"/>
-            <a:ext cx="10058400" cy="4023360"/>
+            <a:off x="838200" y="1825625"/>
+            <a:ext cx="10515600" cy="4351338"/>
           </a:xfrm>
           <a:prstGeom prst="rect">
             <a:avLst/>
           </a:prstGeom>
         </p:spPr>
         <p:txBody>
-          <a:bodyPr vert="horz" lIns="0" tIns="45720" rIns="0" bIns="45720" rtlCol="0">
+          <a:bodyPr vert="horz" lIns="91440" tIns="45720" rIns="91440" bIns="45720" rtlCol="0">
             <a:normAutofit/>
           </a:bodyPr>
           <a:lstStyle/>
@@ -3262,8 +2549,8 @@
         </p:nvSpPr>
         <p:spPr>
           <a:xfrm>
-            <a:off x="1097280" y="6459785"/>
-            <a:ext cx="2472271" cy="365125"/>
+            <a:off x="838200" y="6356350"/>
+            <a:ext cx="2743200" cy="365125"/>
           </a:xfrm>
           <a:prstGeom prst="rect">
             <a:avLst/>
@@ -3273,9 +2560,11 @@
           <a:bodyPr vert="horz" lIns="91440" tIns="45720" rIns="91440" bIns="45720" rtlCol="0" anchor="ctr"/>
           <a:lstStyle>
             <a:lvl1pPr algn="l">
-              <a:defRPr sz="900">
+              <a:defRPr sz="1200">
                 <a:solidFill>
-                  <a:srgbClr val="FFFFFF"/>
+                  <a:schemeClr val="tx1">
+                    <a:tint val="75000"/>
+                  </a:schemeClr>
                 </a:solidFill>
               </a:defRPr>
             </a:lvl1pPr>
@@ -3301,8 +2590,8 @@
         </p:nvSpPr>
         <p:spPr>
           <a:xfrm>
-            <a:off x="3686185" y="6459785"/>
-            <a:ext cx="4822804" cy="365125"/>
+            <a:off x="4038600" y="6356350"/>
+            <a:ext cx="4114800" cy="365125"/>
           </a:xfrm>
           <a:prstGeom prst="rect">
             <a:avLst/>
@@ -3312,9 +2601,11 @@
           <a:bodyPr vert="horz" lIns="91440" tIns="45720" rIns="91440" bIns="45720" rtlCol="0" anchor="ctr"/>
           <a:lstStyle>
             <a:lvl1pPr algn="ctr">
-              <a:defRPr sz="900" cap="all" baseline="0">
+              <a:defRPr sz="1200">
                 <a:solidFill>
-                  <a:srgbClr val="FFFFFF"/>
+                  <a:schemeClr val="tx1">
+                    <a:tint val="75000"/>
+                  </a:schemeClr>
                 </a:solidFill>
               </a:defRPr>
             </a:lvl1pPr>
@@ -3336,8 +2627,8 @@
         </p:nvSpPr>
         <p:spPr>
           <a:xfrm>
-            <a:off x="9900458" y="6459785"/>
-            <a:ext cx="1312025" cy="365125"/>
+            <a:off x="8610600" y="6356350"/>
+            <a:ext cx="2743200" cy="365125"/>
           </a:xfrm>
           <a:prstGeom prst="rect">
             <a:avLst/>
@@ -3347,9 +2638,11 @@
           <a:bodyPr vert="horz" lIns="91440" tIns="45720" rIns="91440" bIns="45720" rtlCol="0" anchor="ctr"/>
           <a:lstStyle>
             <a:lvl1pPr algn="r">
-              <a:defRPr sz="1050">
+              <a:defRPr sz="1200">
                 <a:solidFill>
-                  <a:srgbClr val="FFFFFF"/>
+                  <a:schemeClr val="tx1">
+                    <a:tint val="75000"/>
+                  </a:schemeClr>
                 </a:solidFill>
               </a:defRPr>
             </a:lvl1pPr>
@@ -3363,81 +2656,40 @@
           </a:p>
         </p:txBody>
       </p:sp>
-      <p:cxnSp>
-        <p:nvCxnSpPr>
-          <p:cNvPr id="10" name="Straight Connector 9"/>
-          <p:cNvCxnSpPr/>
-          <p:nvPr/>
-        </p:nvCxnSpPr>
-        <p:spPr>
-          <a:xfrm>
-            <a:off x="1193532" y="1737845"/>
-            <a:ext cx="9966960" cy="0"/>
-          </a:xfrm>
-          <a:prstGeom prst="line">
-            <a:avLst/>
-          </a:prstGeom>
-          <a:ln w="6350">
-            <a:solidFill>
-              <a:schemeClr val="tx1">
-                <a:lumMod val="50000"/>
-                <a:lumOff val="50000"/>
-              </a:schemeClr>
-            </a:solidFill>
-          </a:ln>
-        </p:spPr>
-        <p:style>
-          <a:lnRef idx="1">
-            <a:schemeClr val="accent1"/>
-          </a:lnRef>
-          <a:fillRef idx="0">
-            <a:schemeClr val="accent1"/>
-          </a:fillRef>
-          <a:effectRef idx="0">
-            <a:schemeClr val="accent1"/>
-          </a:effectRef>
-          <a:fontRef idx="minor">
-            <a:schemeClr val="tx1"/>
-          </a:fontRef>
-        </p:style>
-      </p:cxnSp>
     </p:spTree>
     <p:extLst>
       <p:ext uri="{BB962C8B-B14F-4D97-AF65-F5344CB8AC3E}">
-        <p14:creationId xmlns:p14="http://schemas.microsoft.com/office/powerpoint/2010/main" val="1896085709"/>
+        <p14:creationId xmlns:p14="http://schemas.microsoft.com/office/powerpoint/2010/main" val="1247726206"/>
       </p:ext>
     </p:extLst>
   </p:cSld>
-  <p:clrMap bg1="lt1" tx1="dk1" bg2="lt2" tx2="dk2" accent1="accent1" accent2="accent2" accent3="accent3" accent4="accent4" accent5="accent5" accent6="accent6" hlink="hlink" folHlink="folHlink"/>
+  <p:clrMap bg1="dk1" tx1="lt1" bg2="dk2" tx2="lt2" accent1="accent1" accent2="accent2" accent3="accent3" accent4="accent4" accent5="accent5" accent6="accent6" hlink="hlink" folHlink="folHlink"/>
   <p:sldLayoutIdLst>
-    <p:sldLayoutId id="2147483661" r:id="rId1"/>
-    <p:sldLayoutId id="2147483662" r:id="rId2"/>
-    <p:sldLayoutId id="2147483663" r:id="rId3"/>
-    <p:sldLayoutId id="2147483664" r:id="rId4"/>
-    <p:sldLayoutId id="2147483665" r:id="rId5"/>
-    <p:sldLayoutId id="2147483666" r:id="rId6"/>
-    <p:sldLayoutId id="2147483667" r:id="rId7"/>
-    <p:sldLayoutId id="2147483668" r:id="rId8"/>
-    <p:sldLayoutId id="2147483669" r:id="rId9"/>
-    <p:sldLayoutId id="2147483670" r:id="rId10"/>
-    <p:sldLayoutId id="2147483671" r:id="rId11"/>
+    <p:sldLayoutId id="2147483709" r:id="rId1"/>
+    <p:sldLayoutId id="2147483710" r:id="rId2"/>
+    <p:sldLayoutId id="2147483711" r:id="rId3"/>
+    <p:sldLayoutId id="2147483712" r:id="rId4"/>
+    <p:sldLayoutId id="2147483713" r:id="rId5"/>
+    <p:sldLayoutId id="2147483714" r:id="rId6"/>
+    <p:sldLayoutId id="2147483715" r:id="rId7"/>
+    <p:sldLayoutId id="2147483716" r:id="rId8"/>
+    <p:sldLayoutId id="2147483717" r:id="rId9"/>
+    <p:sldLayoutId id="2147483718" r:id="rId10"/>
+    <p:sldLayoutId id="2147483719" r:id="rId11"/>
   </p:sldLayoutIdLst>
   <p:txStyles>
     <p:titleStyle>
       <a:lvl1pPr algn="l" defTabSz="914400" rtl="0" eaLnBrk="1" latinLnBrk="0" hangingPunct="1">
         <a:lnSpc>
-          <a:spcPct val="85000"/>
+          <a:spcPct val="90000"/>
         </a:lnSpc>
         <a:spcBef>
           <a:spcPct val="0"/>
         </a:spcBef>
         <a:buNone/>
-        <a:defRPr sz="4800" kern="1200" spc="-50" baseline="0">
+        <a:defRPr sz="4400" kern="1200">
           <a:solidFill>
-            <a:schemeClr val="tx1">
-              <a:lumMod val="75000"/>
-              <a:lumOff val="25000"/>
-            </a:schemeClr>
+            <a:schemeClr val="tx1"/>
           </a:solidFill>
           <a:latin typeface="+mj-lt"/>
           <a:ea typeface="+mj-ea"/>
@@ -3446,244 +2698,162 @@
       </a:lvl1pPr>
     </p:titleStyle>
     <p:bodyStyle>
-      <a:lvl1pPr marL="91440" indent="-91440" algn="l" defTabSz="914400" rtl="0" eaLnBrk="1" latinLnBrk="0" hangingPunct="1">
+      <a:lvl1pPr marL="228600" indent="-228600" algn="l" defTabSz="914400" rtl="0" eaLnBrk="1" latinLnBrk="0" hangingPunct="1">
         <a:lnSpc>
           <a:spcPct val="90000"/>
         </a:lnSpc>
         <a:spcBef>
-          <a:spcPts val="1200"/>
+          <a:spcPts val="1000"/>
         </a:spcBef>
-        <a:spcAft>
-          <a:spcPts val="200"/>
-        </a:spcAft>
-        <a:buClr>
-          <a:schemeClr val="accent1"/>
-        </a:buClr>
-        <a:buSzPct val="100000"/>
-        <a:buFont typeface="Calibri" panose="020F0502020204030204" pitchFamily="34" charset="0"/>
-        <a:buChar char=" "/>
-        <a:defRPr sz="2000" kern="1200">
+        <a:buFont typeface="Arial" panose="020B0604020202020204" pitchFamily="34" charset="0"/>
+        <a:buChar char="•"/>
+        <a:defRPr sz="2800" kern="1200">
           <a:solidFill>
-            <a:schemeClr val="tx1">
-              <a:lumMod val="75000"/>
-              <a:lumOff val="25000"/>
-            </a:schemeClr>
+            <a:schemeClr val="tx1"/>
           </a:solidFill>
           <a:latin typeface="+mn-lt"/>
           <a:ea typeface="+mn-ea"/>
           <a:cs typeface="+mn-cs"/>
         </a:defRPr>
       </a:lvl1pPr>
-      <a:lvl2pPr marL="384048" indent="-182880" algn="l" defTabSz="914400" rtl="0" eaLnBrk="1" latinLnBrk="0" hangingPunct="1">
+      <a:lvl2pPr marL="685800" indent="-228600" algn="l" defTabSz="914400" rtl="0" eaLnBrk="1" latinLnBrk="0" hangingPunct="1">
         <a:lnSpc>
           <a:spcPct val="90000"/>
         </a:lnSpc>
         <a:spcBef>
-          <a:spcPts val="200"/>
+          <a:spcPts val="500"/>
         </a:spcBef>
-        <a:spcAft>
-          <a:spcPts val="400"/>
-        </a:spcAft>
-        <a:buClr>
-          <a:schemeClr val="accent1"/>
-        </a:buClr>
-        <a:buFont typeface="Calibri" pitchFamily="34" charset="0"/>
-        <a:buChar char="◦"/>
-        <a:defRPr sz="1800" kern="1200">
+        <a:buFont typeface="Arial" panose="020B0604020202020204" pitchFamily="34" charset="0"/>
+        <a:buChar char="•"/>
+        <a:defRPr sz="2400" kern="1200">
           <a:solidFill>
-            <a:schemeClr val="tx1">
-              <a:lumMod val="75000"/>
-              <a:lumOff val="25000"/>
-            </a:schemeClr>
+            <a:schemeClr val="tx1"/>
           </a:solidFill>
           <a:latin typeface="+mn-lt"/>
           <a:ea typeface="+mn-ea"/>
           <a:cs typeface="+mn-cs"/>
         </a:defRPr>
       </a:lvl2pPr>
-      <a:lvl3pPr marL="566928" indent="-182880" algn="l" defTabSz="914400" rtl="0" eaLnBrk="1" latinLnBrk="0" hangingPunct="1">
+      <a:lvl3pPr marL="1143000" indent="-228600" algn="l" defTabSz="914400" rtl="0" eaLnBrk="1" latinLnBrk="0" hangingPunct="1">
         <a:lnSpc>
           <a:spcPct val="90000"/>
         </a:lnSpc>
         <a:spcBef>
-          <a:spcPts val="200"/>
+          <a:spcPts val="500"/>
         </a:spcBef>
-        <a:spcAft>
-          <a:spcPts val="400"/>
-        </a:spcAft>
-        <a:buClr>
-          <a:schemeClr val="accent1"/>
-        </a:buClr>
-        <a:buFont typeface="Calibri" pitchFamily="34" charset="0"/>
-        <a:buChar char="◦"/>
-        <a:defRPr sz="1400" kern="1200">
+        <a:buFont typeface="Arial" panose="020B0604020202020204" pitchFamily="34" charset="0"/>
+        <a:buChar char="•"/>
+        <a:defRPr sz="2000" kern="1200">
           <a:solidFill>
-            <a:schemeClr val="tx1">
-              <a:lumMod val="75000"/>
-              <a:lumOff val="25000"/>
-            </a:schemeClr>
+            <a:schemeClr val="tx1"/>
           </a:solidFill>
           <a:latin typeface="+mn-lt"/>
           <a:ea typeface="+mn-ea"/>
           <a:cs typeface="+mn-cs"/>
         </a:defRPr>
       </a:lvl3pPr>
-      <a:lvl4pPr marL="749808" indent="-182880" algn="l" defTabSz="914400" rtl="0" eaLnBrk="1" latinLnBrk="0" hangingPunct="1">
+      <a:lvl4pPr marL="1600200" indent="-228600" algn="l" defTabSz="914400" rtl="0" eaLnBrk="1" latinLnBrk="0" hangingPunct="1">
         <a:lnSpc>
           <a:spcPct val="90000"/>
         </a:lnSpc>
         <a:spcBef>
-          <a:spcPts val="200"/>
+          <a:spcPts val="500"/>
         </a:spcBef>
-        <a:spcAft>
-          <a:spcPts val="400"/>
-        </a:spcAft>
-        <a:buClr>
-          <a:schemeClr val="accent1"/>
-        </a:buClr>
-        <a:buFont typeface="Calibri" pitchFamily="34" charset="0"/>
-        <a:buChar char="◦"/>
-        <a:defRPr sz="1400" kern="1200">
+        <a:buFont typeface="Arial" panose="020B0604020202020204" pitchFamily="34" charset="0"/>
+        <a:buChar char="•"/>
+        <a:defRPr sz="1800" kern="1200">
           <a:solidFill>
-            <a:schemeClr val="tx1">
-              <a:lumMod val="75000"/>
-              <a:lumOff val="25000"/>
-            </a:schemeClr>
+            <a:schemeClr val="tx1"/>
           </a:solidFill>
           <a:latin typeface="+mn-lt"/>
           <a:ea typeface="+mn-ea"/>
           <a:cs typeface="+mn-cs"/>
         </a:defRPr>
       </a:lvl4pPr>
-      <a:lvl5pPr marL="932688" indent="-182880" algn="l" defTabSz="914400" rtl="0" eaLnBrk="1" latinLnBrk="0" hangingPunct="1">
+      <a:lvl5pPr marL="2057400" indent="-228600" algn="l" defTabSz="914400" rtl="0" eaLnBrk="1" latinLnBrk="0" hangingPunct="1">
         <a:lnSpc>
           <a:spcPct val="90000"/>
         </a:lnSpc>
         <a:spcBef>
-          <a:spcPts val="200"/>
+          <a:spcPts val="500"/>
         </a:spcBef>
-        <a:spcAft>
-          <a:spcPts val="400"/>
-        </a:spcAft>
-        <a:buClr>
-          <a:schemeClr val="accent1"/>
-        </a:buClr>
-        <a:buFont typeface="Calibri" pitchFamily="34" charset="0"/>
-        <a:buChar char="◦"/>
-        <a:defRPr sz="1400" kern="1200">
+        <a:buFont typeface="Arial" panose="020B0604020202020204" pitchFamily="34" charset="0"/>
+        <a:buChar char="•"/>
+        <a:defRPr sz="1800" kern="1200">
           <a:solidFill>
-            <a:schemeClr val="tx1">
-              <a:lumMod val="75000"/>
-              <a:lumOff val="25000"/>
-            </a:schemeClr>
+            <a:schemeClr val="tx1"/>
           </a:solidFill>
           <a:latin typeface="+mn-lt"/>
           <a:ea typeface="+mn-ea"/>
           <a:cs typeface="+mn-cs"/>
         </a:defRPr>
       </a:lvl5pPr>
-      <a:lvl6pPr marL="1100000" indent="-228600" algn="l" defTabSz="914400" rtl="0" eaLnBrk="1" latinLnBrk="0" hangingPunct="1">
+      <a:lvl6pPr marL="2514600" indent="-228600" algn="l" defTabSz="914400" rtl="0" eaLnBrk="1" latinLnBrk="0" hangingPunct="1">
         <a:lnSpc>
           <a:spcPct val="90000"/>
         </a:lnSpc>
         <a:spcBef>
-          <a:spcPts val="200"/>
+          <a:spcPts val="500"/>
         </a:spcBef>
-        <a:spcAft>
-          <a:spcPts val="400"/>
-        </a:spcAft>
-        <a:buClr>
-          <a:schemeClr val="accent1"/>
-        </a:buClr>
-        <a:buFont typeface="Calibri" pitchFamily="34" charset="0"/>
-        <a:buChar char="◦"/>
-        <a:defRPr sz="1400" kern="1200">
+        <a:buFont typeface="Arial" panose="020B0604020202020204" pitchFamily="34" charset="0"/>
+        <a:buChar char="•"/>
+        <a:defRPr sz="1800" kern="1200">
           <a:solidFill>
-            <a:schemeClr val="tx1">
-              <a:lumMod val="75000"/>
-              <a:lumOff val="25000"/>
-            </a:schemeClr>
+            <a:schemeClr val="tx1"/>
           </a:solidFill>
           <a:latin typeface="+mn-lt"/>
           <a:ea typeface="+mn-ea"/>
           <a:cs typeface="+mn-cs"/>
         </a:defRPr>
       </a:lvl6pPr>
-      <a:lvl7pPr marL="1300000" indent="-228600" algn="l" defTabSz="914400" rtl="0" eaLnBrk="1" latinLnBrk="0" hangingPunct="1">
+      <a:lvl7pPr marL="2971800" indent="-228600" algn="l" defTabSz="914400" rtl="0" eaLnBrk="1" latinLnBrk="0" hangingPunct="1">
         <a:lnSpc>
           <a:spcPct val="90000"/>
         </a:lnSpc>
         <a:spcBef>
-          <a:spcPts val="200"/>
+          <a:spcPts val="500"/>
         </a:spcBef>
-        <a:spcAft>
-          <a:spcPts val="400"/>
-        </a:spcAft>
-        <a:buClr>
-          <a:schemeClr val="accent1"/>
-        </a:buClr>
-        <a:buFont typeface="Calibri" pitchFamily="34" charset="0"/>
-        <a:buChar char="◦"/>
-        <a:defRPr sz="1400" kern="1200">
+        <a:buFont typeface="Arial" panose="020B0604020202020204" pitchFamily="34" charset="0"/>
+        <a:buChar char="•"/>
+        <a:defRPr sz="1800" kern="1200">
           <a:solidFill>
-            <a:schemeClr val="tx1">
-              <a:lumMod val="75000"/>
-              <a:lumOff val="25000"/>
-            </a:schemeClr>
+            <a:schemeClr val="tx1"/>
           </a:solidFill>
           <a:latin typeface="+mn-lt"/>
           <a:ea typeface="+mn-ea"/>
           <a:cs typeface="+mn-cs"/>
         </a:defRPr>
       </a:lvl7pPr>
-      <a:lvl8pPr marL="1500000" indent="-228600" algn="l" defTabSz="914400" rtl="0" eaLnBrk="1" latinLnBrk="0" hangingPunct="1">
+      <a:lvl8pPr marL="3429000" indent="-228600" algn="l" defTabSz="914400" rtl="0" eaLnBrk="1" latinLnBrk="0" hangingPunct="1">
         <a:lnSpc>
           <a:spcPct val="90000"/>
         </a:lnSpc>
         <a:spcBef>
-          <a:spcPts val="200"/>
+          <a:spcPts val="500"/>
         </a:spcBef>
-        <a:spcAft>
-          <a:spcPts val="400"/>
-        </a:spcAft>
-        <a:buClr>
-          <a:schemeClr val="accent1"/>
-        </a:buClr>
-        <a:buFont typeface="Calibri" pitchFamily="34" charset="0"/>
-        <a:buChar char="◦"/>
-        <a:defRPr sz="1400" kern="1200">
+        <a:buFont typeface="Arial" panose="020B0604020202020204" pitchFamily="34" charset="0"/>
+        <a:buChar char="•"/>
+        <a:defRPr sz="1800" kern="1200">
           <a:solidFill>
-            <a:schemeClr val="tx1">
-              <a:lumMod val="75000"/>
-              <a:lumOff val="25000"/>
-            </a:schemeClr>
+            <a:schemeClr val="tx1"/>
           </a:solidFill>
           <a:latin typeface="+mn-lt"/>
           <a:ea typeface="+mn-ea"/>
           <a:cs typeface="+mn-cs"/>
         </a:defRPr>
       </a:lvl8pPr>
-      <a:lvl9pPr marL="1700000" indent="-228600" algn="l" defTabSz="914400" rtl="0" eaLnBrk="1" latinLnBrk="0" hangingPunct="1">
+      <a:lvl9pPr marL="3886200" indent="-228600" algn="l" defTabSz="914400" rtl="0" eaLnBrk="1" latinLnBrk="0" hangingPunct="1">
         <a:lnSpc>
           <a:spcPct val="90000"/>
         </a:lnSpc>
         <a:spcBef>
-          <a:spcPts val="200"/>
+          <a:spcPts val="500"/>
         </a:spcBef>
-        <a:spcAft>
-          <a:spcPts val="400"/>
-        </a:spcAft>
-        <a:buClr>
-          <a:schemeClr val="accent1"/>
-        </a:buClr>
-        <a:buFont typeface="Calibri" pitchFamily="34" charset="0"/>
-        <a:buChar char="◦"/>
-        <a:defRPr sz="1400" kern="1200">
+        <a:buFont typeface="Arial" panose="020B0604020202020204" pitchFamily="34" charset="0"/>
+        <a:buChar char="•"/>
+        <a:defRPr sz="1800" kern="1200">
           <a:solidFill>
-            <a:schemeClr val="tx1">
-              <a:lumMod val="75000"/>
-              <a:lumOff val="25000"/>
-            </a:schemeClr>
+            <a:schemeClr val="tx1"/>
           </a:solidFill>
           <a:latin typeface="+mn-lt"/>
           <a:ea typeface="+mn-ea"/>
@@ -3875,21 +3045,15 @@
           <a:p>
             <a:pPr algn="ctr"/>
             <a:r>
-              <a:rPr lang="en-US" sz="3200" b="1" dirty="0"/>
-              <a:t>Marvin </a:t>
-            </a:r>
-            <a:r>
-              <a:rPr lang="en-US" sz="3200" b="1" dirty="0" err="1"/>
-              <a:t>heng</a:t>
+              <a:rPr lang="en-US" sz="3200" b="1"/>
+              <a:t>Marvin Heng</a:t>
             </a:r>
             <a:endParaRPr lang="en-US" sz="3200" b="1" dirty="0"/>
           </a:p>
           <a:p>
             <a:pPr algn="ctr"/>
             <a:r>
-              <a:rPr lang="en-US" sz="2000" dirty="0">
-                <a:hlinkClick r:id="rId2"/>
-              </a:rPr>
+              <a:rPr lang="en-US" sz="2000" dirty="0"/>
               <a:t>www.techconnect.io</a:t>
             </a:r>
             <a:br>
@@ -4070,6 +3234,11 @@
             <a:chOff x="5616575" y="2752592"/>
             <a:chExt cx="1352396" cy="1047883"/>
           </a:xfrm>
+          <a:solidFill>
+            <a:schemeClr val="tx1">
+              <a:lumMod val="95000"/>
+            </a:schemeClr>
+          </a:solidFill>
         </p:grpSpPr>
         <p:sp>
           <p:nvSpPr>
@@ -4091,11 +3260,7 @@
             <a:prstGeom prst="rect">
               <a:avLst/>
             </a:prstGeom>
-            <a:solidFill>
-              <a:schemeClr val="bg1">
-                <a:lumMod val="95000"/>
-              </a:schemeClr>
-            </a:solidFill>
+            <a:grpFill/>
             <a:ln>
               <a:solidFill>
                 <a:schemeClr val="tx1"/>
@@ -4138,7 +3303,7 @@
                   <a:spcPts val="800"/>
                 </a:spcAft>
               </a:pPr>
-              <a:endParaRPr lang="en-US" sz="3200">
+              <a:endParaRPr lang="en-US" sz="3200" dirty="0">
                 <a:solidFill>
                   <a:srgbClr val="000000"/>
                 </a:solidFill>
@@ -4160,7 +3325,7 @@
                 </a:spcAft>
               </a:pPr>
               <a:r>
-                <a:rPr lang="en-US" i="1">
+                <a:rPr lang="en-US" i="1" dirty="0" err="1">
                   <a:solidFill>
                     <a:srgbClr val="000000"/>
                   </a:solidFill>
@@ -4170,7 +3335,7 @@
                 </a:rPr>
                 <a:t>CosmosDB</a:t>
               </a:r>
-              <a:endParaRPr lang="en-US" sz="3200">
+              <a:endParaRPr lang="en-US" sz="3200" dirty="0">
                 <a:effectLst/>
                 <a:ea typeface="Calibri" panose="020F0502020204030204" pitchFamily="34" charset="0"/>
                 <a:cs typeface="Times New Roman" panose="02020603050405020304" pitchFamily="18" charset="0"/>
@@ -4209,7 +3374,7 @@
             <a:prstGeom prst="rect">
               <a:avLst/>
             </a:prstGeom>
-            <a:noFill/>
+            <a:grpFill/>
             <a:ln>
               <a:noFill/>
             </a:ln>
@@ -4242,7 +3407,7 @@
             <a:avLst/>
           </a:prstGeom>
           <a:solidFill>
-            <a:schemeClr val="bg1">
+            <a:schemeClr val="tx1">
               <a:lumMod val="95000"/>
             </a:schemeClr>
           </a:solidFill>
@@ -4291,7 +3456,7 @@
             <a:r>
               <a:rPr lang="en-US" sz="1600" b="1" dirty="0">
                 <a:solidFill>
-                  <a:srgbClr val="000000"/>
+                  <a:schemeClr val="bg1"/>
                 </a:solidFill>
                 <a:effectLst/>
                 <a:ea typeface="Calibri" panose="020F0502020204030204" pitchFamily="34" charset="0"/>
@@ -4300,6 +3465,9 @@
               <a:t>Client 1</a:t>
             </a:r>
             <a:endParaRPr lang="en-US" sz="1600" dirty="0">
+              <a:solidFill>
+                <a:schemeClr val="bg1"/>
+              </a:solidFill>
               <a:effectLst/>
               <a:ea typeface="Calibri" panose="020F0502020204030204" pitchFamily="34" charset="0"/>
               <a:cs typeface="Times New Roman" panose="02020603050405020304" pitchFamily="18" charset="0"/>
@@ -4328,7 +3496,7 @@
             <a:avLst/>
           </a:prstGeom>
           <a:solidFill>
-            <a:schemeClr val="bg1">
+            <a:schemeClr val="tx1">
               <a:lumMod val="95000"/>
             </a:schemeClr>
           </a:solidFill>
@@ -4377,7 +3545,7 @@
             <a:r>
               <a:rPr lang="en-US" sz="1600" b="1" dirty="0">
                 <a:solidFill>
-                  <a:srgbClr val="000000"/>
+                  <a:schemeClr val="bg1"/>
                 </a:solidFill>
                 <a:effectLst/>
                 <a:ea typeface="Calibri" panose="020F0502020204030204" pitchFamily="34" charset="0"/>
@@ -4386,6 +3554,9 @@
               <a:t>Client 2</a:t>
             </a:r>
             <a:endParaRPr lang="en-US" sz="1600" dirty="0">
+              <a:solidFill>
+                <a:schemeClr val="bg1"/>
+              </a:solidFill>
               <a:effectLst/>
               <a:ea typeface="Calibri" panose="020F0502020204030204" pitchFamily="34" charset="0"/>
               <a:cs typeface="Times New Roman" panose="02020603050405020304" pitchFamily="18" charset="0"/>
@@ -4458,7 +3629,6 @@
             <a:solidFill>
               <a:schemeClr val="tx1">
                 <a:lumMod val="95000"/>
-                <a:lumOff val="5000"/>
               </a:schemeClr>
             </a:solidFill>
             <a:tailEnd type="triangle"/>
@@ -4505,6 +3675,11 @@
             </a:avLst>
           </a:prstGeom>
           <a:ln w="28575">
+            <a:solidFill>
+              <a:schemeClr val="tx1">
+                <a:lumMod val="95000"/>
+              </a:schemeClr>
+            </a:solidFill>
             <a:tailEnd type="triangle"/>
           </a:ln>
         </p:spPr>
@@ -4546,7 +3721,6 @@
           <a:solidFill>
             <a:schemeClr val="tx1">
               <a:lumMod val="95000"/>
-              <a:lumOff val="5000"/>
             </a:schemeClr>
           </a:solidFill>
           <a:ln>
@@ -4580,7 +3754,11 @@
           <a:p>
             <a:pPr algn="ctr"/>
             <a:r>
-              <a:rPr lang="en-US" dirty="0"/>
+              <a:rPr lang="en-US" dirty="0">
+                <a:solidFill>
+                  <a:schemeClr val="bg1"/>
+                </a:solidFill>
+              </a:rPr>
               <a:t>Stored Procedure</a:t>
             </a:r>
           </a:p>
@@ -4707,6 +3885,101 @@
           <p:cNvPr id="2" name="Title 1">
             <a:extLst>
               <a:ext uri="{FF2B5EF4-FFF2-40B4-BE49-F238E27FC236}">
+                <a16:creationId xmlns:a16="http://schemas.microsoft.com/office/drawing/2014/main" id="{CAF470B2-53AB-4DA5-984D-16D33F57A8D0}"/>
+              </a:ext>
+            </a:extLst>
+          </p:cNvPr>
+          <p:cNvSpPr>
+            <a:spLocks noGrp="1"/>
+          </p:cNvSpPr>
+          <p:nvPr>
+            <p:ph type="title"/>
+          </p:nvPr>
+        </p:nvSpPr>
+        <p:spPr/>
+        <p:txBody>
+          <a:bodyPr/>
+          <a:lstStyle/>
+          <a:p>
+            <a:pPr algn="ctr"/>
+            <a:r>
+              <a:rPr lang="en-US" dirty="0"/>
+              <a:t>Git Repo</a:t>
+            </a:r>
+          </a:p>
+        </p:txBody>
+      </p:sp>
+      <p:sp>
+        <p:nvSpPr>
+          <p:cNvPr id="3" name="Content Placeholder 2">
+            <a:extLst>
+              <a:ext uri="{FF2B5EF4-FFF2-40B4-BE49-F238E27FC236}">
+                <a16:creationId xmlns:a16="http://schemas.microsoft.com/office/drawing/2014/main" id="{D7527827-D54F-45DA-90CC-9328A36E508D}"/>
+              </a:ext>
+            </a:extLst>
+          </p:cNvPr>
+          <p:cNvSpPr>
+            <a:spLocks noGrp="1"/>
+          </p:cNvSpPr>
+          <p:nvPr>
+            <p:ph idx="1"/>
+          </p:nvPr>
+        </p:nvSpPr>
+        <p:spPr>
+          <a:xfrm>
+            <a:off x="1097280" y="2796466"/>
+            <a:ext cx="10058400" cy="3072628"/>
+          </a:xfrm>
+        </p:spPr>
+        <p:txBody>
+          <a:bodyPr>
+            <a:normAutofit/>
+          </a:bodyPr>
+          <a:lstStyle/>
+          <a:p>
+            <a:pPr algn="ctr"/>
+            <a:r>
+              <a:rPr lang="en-US" sz="3600" dirty="0"/>
+              <a:t>https://github.com/hmheng/CosmosDBSPDemo</a:t>
+            </a:r>
+          </a:p>
+        </p:txBody>
+      </p:sp>
+    </p:spTree>
+    <p:extLst>
+      <p:ext uri="{BB962C8B-B14F-4D97-AF65-F5344CB8AC3E}">
+        <p14:creationId xmlns:p14="http://schemas.microsoft.com/office/powerpoint/2010/main" val="573856178"/>
+      </p:ext>
+    </p:extLst>
+  </p:cSld>
+  <p:clrMapOvr>
+    <a:masterClrMapping/>
+  </p:clrMapOvr>
+</p:sld>
+</file>
+
+<file path=ppt/slides/slide5.xml><?xml version="1.0" encoding="utf-8"?>
+<p:sld xmlns:a="http://schemas.openxmlformats.org/drawingml/2006/main" xmlns:r="http://schemas.openxmlformats.org/officeDocument/2006/relationships" xmlns:p="http://schemas.openxmlformats.org/presentationml/2006/main">
+  <p:cSld>
+    <p:spTree>
+      <p:nvGrpSpPr>
+        <p:cNvPr id="1" name=""/>
+        <p:cNvGrpSpPr/>
+        <p:nvPr/>
+      </p:nvGrpSpPr>
+      <p:grpSpPr>
+        <a:xfrm>
+          <a:off x="0" y="0"/>
+          <a:ext cx="0" cy="0"/>
+          <a:chOff x="0" y="0"/>
+          <a:chExt cx="0" cy="0"/>
+        </a:xfrm>
+      </p:grpSpPr>
+      <p:sp>
+        <p:nvSpPr>
+          <p:cNvPr id="2" name="Title 1">
+            <a:extLst>
+              <a:ext uri="{FF2B5EF4-FFF2-40B4-BE49-F238E27FC236}">
                 <a16:creationId xmlns:a16="http://schemas.microsoft.com/office/drawing/2014/main" id="{9DB59FDD-E474-4C7C-B1D6-3ABB73ACF905}"/>
               </a:ext>
             </a:extLst>
@@ -4771,20 +4044,13 @@
             <a:pPr algn="ctr"/>
             <a:r>
               <a:rPr lang="en-US" sz="3200" b="1" dirty="0"/>
-              <a:t>Marvin </a:t>
-            </a:r>
-            <a:r>
-              <a:rPr lang="en-US" sz="3200" b="1" dirty="0" err="1"/>
-              <a:t>heng</a:t>
-            </a:r>
-            <a:endParaRPr lang="en-US" sz="3200" b="1" dirty="0"/>
+              <a:t>Marvin Heng</a:t>
+            </a:r>
           </a:p>
           <a:p>
             <a:pPr algn="ctr"/>
             <a:r>
-              <a:rPr lang="en-US" sz="2000" dirty="0">
-                <a:hlinkClick r:id="rId2"/>
-              </a:rPr>
+              <a:rPr lang="en-US" sz="2000" dirty="0"/>
               <a:t>www.techconnect.io</a:t>
             </a:r>
             <a:br>
@@ -4819,54 +4085,54 @@
 </file>
 
 <file path=ppt/theme/theme1.xml><?xml version="1.0" encoding="utf-8"?>
-<a:theme xmlns:a="http://schemas.openxmlformats.org/drawingml/2006/main" name="Retrospect">
+<a:theme xmlns:a="http://schemas.openxmlformats.org/drawingml/2006/main" name="Office Theme">
   <a:themeElements>
-    <a:clrScheme name="Retrospect">
+    <a:clrScheme name="Office Theme">
       <a:dk1>
-        <a:srgbClr val="000000"/>
+        <a:sysClr val="windowText" lastClr="000000"/>
       </a:dk1>
       <a:lt1>
         <a:sysClr val="window" lastClr="FFFFFF"/>
       </a:lt1>
       <a:dk2>
-        <a:srgbClr val="637052"/>
+        <a:srgbClr val="44546A"/>
       </a:dk2>
       <a:lt2>
-        <a:srgbClr val="CCDDEA"/>
+        <a:srgbClr val="E7E6E6"/>
       </a:lt2>
       <a:accent1>
-        <a:srgbClr val="E48312"/>
+        <a:srgbClr val="29AF8C"/>
       </a:accent1>
       <a:accent2>
-        <a:srgbClr val="BD582C"/>
+        <a:srgbClr val="97BE49"/>
       </a:accent2>
       <a:accent3>
-        <a:srgbClr val="865640"/>
+        <a:srgbClr val="3D9CCC"/>
       </a:accent3>
       <a:accent4>
-        <a:srgbClr val="9B8357"/>
+        <a:srgbClr val="7C60C6"/>
       </a:accent4>
       <a:accent5>
-        <a:srgbClr val="C2BC80"/>
+        <a:srgbClr val="C9492C"/>
       </a:accent5>
       <a:accent6>
-        <a:srgbClr val="94A088"/>
+        <a:srgbClr val="D58C2E"/>
       </a:accent6>
       <a:hlink>
-        <a:srgbClr val="2998E3"/>
+        <a:srgbClr val="0563C1"/>
       </a:hlink>
       <a:folHlink>
-        <a:srgbClr val="8C8C8C"/>
+        <a:srgbClr val="954F72"/>
       </a:folHlink>
     </a:clrScheme>
-    <a:fontScheme name="Retrospect">
+    <a:fontScheme name="Office Theme">
       <a:majorFont>
         <a:latin typeface="Calibri Light" panose="020F0302020204030204"/>
         <a:ea typeface=""/>
         <a:cs typeface=""/>
-        <a:font script="Jpan" typeface="ＭＳ Ｐゴシック"/>
+        <a:font script="Jpan" typeface="游ゴシック Light"/>
         <a:font script="Hang" typeface="맑은 고딕"/>
-        <a:font script="Hans" typeface="宋体"/>
+        <a:font script="Hans" typeface="等线 Light"/>
         <a:font script="Hant" typeface="新細明體"/>
         <a:font script="Arab" typeface="Times New Roman"/>
         <a:font script="Hebr" typeface="Times New Roman"/>
@@ -4899,9 +4165,9 @@
         <a:latin typeface="Calibri" panose="020F0502020204030204"/>
         <a:ea typeface=""/>
         <a:cs typeface=""/>
-        <a:font script="Jpan" typeface="ＭＳ Ｐゴシック"/>
+        <a:font script="Jpan" typeface="游ゴシック"/>
         <a:font script="Hang" typeface="맑은 고딕"/>
-        <a:font script="Hans" typeface="宋体"/>
+        <a:font script="Hans" typeface="等线"/>
         <a:font script="Hant" typeface="新細明體"/>
         <a:font script="Arab" typeface="Arial"/>
         <a:font script="Hebr" typeface="Arial"/>
@@ -4931,7 +4197,7 @@
         <a:font script="Geor" typeface="Sylfaen"/>
       </a:minorFont>
     </a:fontScheme>
-    <a:fmtScheme name="Retrospect">
+    <a:fmtScheme name="Office Theme">
       <a:fillStyleLst>
         <a:solidFill>
           <a:schemeClr val="phClr"/>
@@ -4940,81 +4206,76 @@
           <a:gsLst>
             <a:gs pos="0">
               <a:schemeClr val="phClr">
-                <a:tint val="65000"/>
-                <a:shade val="92000"/>
-                <a:satMod val="130000"/>
+                <a:lumMod val="110000"/>
+                <a:satMod val="105000"/>
+                <a:tint val="67000"/>
               </a:schemeClr>
             </a:gs>
-            <a:gs pos="45000">
+            <a:gs pos="50000">
               <a:schemeClr val="phClr">
-                <a:tint val="60000"/>
-                <a:shade val="99000"/>
-                <a:satMod val="120000"/>
+                <a:lumMod val="105000"/>
+                <a:satMod val="103000"/>
+                <a:tint val="73000"/>
               </a:schemeClr>
             </a:gs>
             <a:gs pos="100000">
               <a:schemeClr val="phClr">
-                <a:tint val="55000"/>
-                <a:satMod val="140000"/>
+                <a:lumMod val="105000"/>
+                <a:satMod val="109000"/>
+                <a:tint val="81000"/>
               </a:schemeClr>
             </a:gs>
           </a:gsLst>
-          <a:path path="circle">
-            <a:fillToRect l="100000" t="100000" r="100000" b="100000"/>
-          </a:path>
+          <a:lin ang="5400000" scaled="0"/>
         </a:gradFill>
         <a:gradFill rotWithShape="1">
           <a:gsLst>
             <a:gs pos="0">
               <a:schemeClr val="phClr">
-                <a:shade val="85000"/>
-                <a:satMod val="130000"/>
+                <a:satMod val="103000"/>
+                <a:lumMod val="102000"/>
+                <a:tint val="94000"/>
               </a:schemeClr>
             </a:gs>
-            <a:gs pos="34000">
+            <a:gs pos="50000">
               <a:schemeClr val="phClr">
-                <a:shade val="87000"/>
-                <a:satMod val="125000"/>
-              </a:schemeClr>
-            </a:gs>
-            <a:gs pos="70000">
-              <a:schemeClr val="phClr">
-                <a:tint val="100000"/>
-                <a:shade val="90000"/>
-                <a:satMod val="130000"/>
+                <a:satMod val="110000"/>
+                <a:lumMod val="100000"/>
+                <a:shade val="100000"/>
               </a:schemeClr>
             </a:gs>
             <a:gs pos="100000">
               <a:schemeClr val="phClr">
-                <a:tint val="100000"/>
-                <a:shade val="100000"/>
-                <a:satMod val="110000"/>
+                <a:lumMod val="99000"/>
+                <a:satMod val="120000"/>
+                <a:shade val="78000"/>
               </a:schemeClr>
             </a:gs>
           </a:gsLst>
-          <a:path path="circle">
-            <a:fillToRect l="100000" t="100000" r="100000" b="100000"/>
-          </a:path>
+          <a:lin ang="5400000" scaled="0"/>
         </a:gradFill>
       </a:fillStyleLst>
       <a:lnStyleLst>
+        <a:ln w="6350" cap="flat" cmpd="sng" algn="ctr">
+          <a:solidFill>
+            <a:schemeClr val="phClr"/>
+          </a:solidFill>
+          <a:prstDash val="solid"/>
+          <a:miter lim="800000"/>
+        </a:ln>
         <a:ln w="12700" cap="flat" cmpd="sng" algn="ctr">
           <a:solidFill>
             <a:schemeClr val="phClr"/>
           </a:solidFill>
           <a:prstDash val="solid"/>
+          <a:miter lim="800000"/>
         </a:ln>
-        <a:ln w="15875" cap="flat" cmpd="sng" algn="ctr">
+        <a:ln w="19050" cap="flat" cmpd="sng" algn="ctr">
           <a:solidFill>
             <a:schemeClr val="phClr"/>
           </a:solidFill>
           <a:prstDash val="solid"/>
-        </a:ln>
-        <a:ln w="25400" cap="flat" cmpd="sng" algn="ctr">
-          <a:solidFill>
-            <a:schemeClr val="phClr"/>
-          </a:solidFill>
-          <a:prstDash val="solid"/>
+          <a:miter lim="800000"/>
         </a:ln>
       </a:lnStyleLst>
       <a:effectStyleLst>
@@ -5022,33 +4283,16 @@
           <a:effectLst/>
         </a:effectStyle>
         <a:effectStyle>
+          <a:effectLst/>
+        </a:effectStyle>
+        <a:effectStyle>
           <a:effectLst>
-            <a:outerShdw blurRad="38100" dist="25400" dir="2700000" algn="br" rotWithShape="0">
+            <a:outerShdw blurRad="57150" dist="19050" dir="5400000" algn="ctr" rotWithShape="0">
               <a:srgbClr val="000000">
-                <a:alpha val="60000"/>
+                <a:alpha val="63000"/>
               </a:srgbClr>
             </a:outerShdw>
           </a:effectLst>
-        </a:effectStyle>
-        <a:effectStyle>
-          <a:effectLst>
-            <a:outerShdw blurRad="44450" dist="25400" dir="2700000" algn="br" rotWithShape="0">
-              <a:srgbClr val="000000">
-                <a:alpha val="60000"/>
-              </a:srgbClr>
-            </a:outerShdw>
-          </a:effectLst>
-          <a:scene3d>
-            <a:camera prst="orthographicFront">
-              <a:rot lat="0" lon="0" rev="0"/>
-            </a:camera>
-            <a:lightRig rig="threePt" dir="t">
-              <a:rot lat="0" lon="0" rev="19800000"/>
-            </a:lightRig>
-          </a:scene3d>
-          <a:sp3d prstMaterial="flat">
-            <a:bevelT w="25400" h="31750"/>
-          </a:sp3d>
         </a:effectStyle>
       </a:effectStyleLst>
       <a:bgFillStyleLst>
@@ -5057,36 +4301,36 @@
         </a:solidFill>
         <a:solidFill>
           <a:schemeClr val="phClr">
-            <a:tint val="90000"/>
-            <a:shade val="97000"/>
-            <a:satMod val="130000"/>
+            <a:tint val="95000"/>
+            <a:satMod val="170000"/>
           </a:schemeClr>
         </a:solidFill>
         <a:gradFill rotWithShape="1">
           <a:gsLst>
             <a:gs pos="0">
               <a:schemeClr val="phClr">
-                <a:tint val="96000"/>
-                <a:shade val="99000"/>
-                <a:satMod val="140000"/>
+                <a:tint val="93000"/>
+                <a:satMod val="150000"/>
+                <a:shade val="98000"/>
+                <a:lumMod val="102000"/>
               </a:schemeClr>
             </a:gs>
-            <a:gs pos="65000">
+            <a:gs pos="50000">
               <a:schemeClr val="phClr">
-                <a:tint val="100000"/>
-                <a:shade val="80000"/>
+                <a:tint val="98000"/>
                 <a:satMod val="130000"/>
+                <a:shade val="90000"/>
+                <a:lumMod val="103000"/>
               </a:schemeClr>
             </a:gs>
             <a:gs pos="100000">
               <a:schemeClr val="phClr">
-                <a:tint val="100000"/>
-                <a:shade val="48000"/>
+                <a:shade val="63000"/>
                 <a:satMod val="120000"/>
               </a:schemeClr>
             </a:gs>
           </a:gsLst>
-          <a:lin ang="16200000" scaled="0"/>
+          <a:lin ang="5400000" scaled="0"/>
         </a:gradFill>
       </a:bgFillStyleLst>
     </a:fmtScheme>
@@ -5095,7 +4339,7 @@
   <a:extraClrSchemeLst/>
   <a:extLst>
     <a:ext uri="{05A4C25C-085E-4340-85A3-A5531E510DB2}">
-      <thm15:themeFamily xmlns:thm15="http://schemas.microsoft.com/office/thememl/2012/main" name="Retrospect" id="{5F128B03-DCCA-4EEB-AB3B-CF2899314A46}" vid="{3F1AAB62-24C6-49D2-8E01-B56FAC9A3DCD}"/>
+      <thm15:themeFamily xmlns:thm15="http://schemas.microsoft.com/office/thememl/2012/main" name="Office Theme" id="{62F939B6-93AF-4DB8-9C6B-D6C7DFDC589F}" vid="{3E4F19A7-A959-40BB-972C-4880BAF8EB09}"/>
     </a:ext>
   </a:extLst>
 </a:theme>

</xml_diff>

<commit_message>
190226 update slide 3
</commit_message>
<xml_diff>
--- a/CosmosDBSPDemo.pptx
+++ b/CosmosDBSPDemo.pptx
@@ -10,6 +10,7 @@
     <p:sldId id="256" r:id="rId4"/>
     <p:sldId id="261" r:id="rId5"/>
     <p:sldId id="258" r:id="rId6"/>
+    <p:sldId id="262" r:id="rId7"/>
   </p:sldIdLst>
   <p:sldSz cx="12192000" cy="6858000"/>
   <p:notesSz cx="6858000" cy="9144000"/>
@@ -3045,10 +3046,9 @@
           <a:p>
             <a:pPr algn="ctr"/>
             <a:r>
-              <a:rPr lang="en-US" sz="3200" b="1"/>
+              <a:rPr lang="en-US" sz="3200" b="1" dirty="0"/>
               <a:t>Marvin Heng</a:t>
             </a:r>
-            <a:endParaRPr lang="en-US" sz="3200" b="1" dirty="0"/>
           </a:p>
           <a:p>
             <a:pPr algn="ctr"/>
@@ -4075,6 +4075,207 @@
     <p:extLst>
       <p:ext uri="{BB962C8B-B14F-4D97-AF65-F5344CB8AC3E}">
         <p14:creationId xmlns:p14="http://schemas.microsoft.com/office/powerpoint/2010/main" val="1069435453"/>
+      </p:ext>
+    </p:extLst>
+  </p:cSld>
+  <p:clrMapOvr>
+    <a:masterClrMapping/>
+  </p:clrMapOvr>
+</p:sld>
+</file>
+
+<file path=ppt/slides/slide6.xml><?xml version="1.0" encoding="utf-8"?>
+<p:sld xmlns:a="http://schemas.openxmlformats.org/drawingml/2006/main" xmlns:r="http://schemas.openxmlformats.org/officeDocument/2006/relationships" xmlns:p="http://schemas.openxmlformats.org/presentationml/2006/main">
+  <p:cSld>
+    <p:spTree>
+      <p:nvGrpSpPr>
+        <p:cNvPr id="1" name=""/>
+        <p:cNvGrpSpPr/>
+        <p:nvPr/>
+      </p:nvGrpSpPr>
+      <p:grpSpPr>
+        <a:xfrm>
+          <a:off x="0" y="0"/>
+          <a:ext cx="0" cy="0"/>
+          <a:chOff x="0" y="0"/>
+          <a:chExt cx="0" cy="0"/>
+        </a:xfrm>
+      </p:grpSpPr>
+      <p:sp>
+        <p:nvSpPr>
+          <p:cNvPr id="5" name="Rectangle 4">
+            <a:extLst>
+              <a:ext uri="{FF2B5EF4-FFF2-40B4-BE49-F238E27FC236}">
+                <a16:creationId xmlns:a16="http://schemas.microsoft.com/office/drawing/2014/main" id="{A099C200-BEBC-4BDF-993C-F77C7FEB1B96}"/>
+              </a:ext>
+            </a:extLst>
+          </p:cNvPr>
+          <p:cNvSpPr/>
+          <p:nvPr/>
+        </p:nvSpPr>
+        <p:spPr>
+          <a:xfrm>
+            <a:off x="0" y="1908698"/>
+            <a:ext cx="12192000" cy="4949301"/>
+          </a:xfrm>
+          <a:prstGeom prst="rect">
+            <a:avLst/>
+          </a:prstGeom>
+          <a:solidFill>
+            <a:schemeClr val="tx1"/>
+          </a:solidFill>
+        </p:spPr>
+        <p:style>
+          <a:lnRef idx="2">
+            <a:schemeClr val="accent1">
+              <a:shade val="50000"/>
+            </a:schemeClr>
+          </a:lnRef>
+          <a:fillRef idx="1">
+            <a:schemeClr val="accent1"/>
+          </a:fillRef>
+          <a:effectRef idx="0">
+            <a:schemeClr val="accent1"/>
+          </a:effectRef>
+          <a:fontRef idx="minor">
+            <a:schemeClr val="lt1"/>
+          </a:fontRef>
+        </p:style>
+        <p:txBody>
+          <a:bodyPr rtlCol="0" anchor="ctr"/>
+          <a:lstStyle/>
+          <a:p>
+            <a:pPr algn="ctr"/>
+            <a:endParaRPr lang="en-US"/>
+          </a:p>
+        </p:txBody>
+      </p:sp>
+      <p:sp>
+        <p:nvSpPr>
+          <p:cNvPr id="2" name="Title 1">
+            <a:extLst>
+              <a:ext uri="{FF2B5EF4-FFF2-40B4-BE49-F238E27FC236}">
+                <a16:creationId xmlns:a16="http://schemas.microsoft.com/office/drawing/2014/main" id="{5A4BBF09-F7EB-43F5-A224-83218BC9B60F}"/>
+              </a:ext>
+            </a:extLst>
+          </p:cNvPr>
+          <p:cNvSpPr>
+            <a:spLocks noGrp="1"/>
+          </p:cNvSpPr>
+          <p:nvPr>
+            <p:ph type="title"/>
+          </p:nvPr>
+        </p:nvSpPr>
+        <p:spPr/>
+        <p:txBody>
+          <a:bodyPr/>
+          <a:lstStyle/>
+          <a:p>
+            <a:pPr algn="ctr"/>
+            <a:r>
+              <a:rPr lang="en-US" dirty="0"/>
+              <a:t>We appreciate your feedback!</a:t>
+            </a:r>
+          </a:p>
+        </p:txBody>
+      </p:sp>
+      <p:sp>
+        <p:nvSpPr>
+          <p:cNvPr id="3" name="Content Placeholder 2">
+            <a:extLst>
+              <a:ext uri="{FF2B5EF4-FFF2-40B4-BE49-F238E27FC236}">
+                <a16:creationId xmlns:a16="http://schemas.microsoft.com/office/drawing/2014/main" id="{06B088CD-0E3D-41B1-886D-42FA3F723451}"/>
+              </a:ext>
+            </a:extLst>
+          </p:cNvPr>
+          <p:cNvSpPr>
+            <a:spLocks noGrp="1"/>
+          </p:cNvSpPr>
+          <p:nvPr>
+            <p:ph idx="1"/>
+          </p:nvPr>
+        </p:nvSpPr>
+        <p:spPr>
+          <a:xfrm>
+            <a:off x="838200" y="5663953"/>
+            <a:ext cx="10515600" cy="513010"/>
+          </a:xfrm>
+        </p:spPr>
+        <p:txBody>
+          <a:bodyPr/>
+          <a:lstStyle/>
+          <a:p>
+            <a:pPr marL="0" indent="0" algn="ctr">
+              <a:buNone/>
+            </a:pPr>
+            <a:r>
+              <a:rPr lang="en-US" dirty="0">
+                <a:hlinkClick r:id="rId2"/>
+              </a:rPr>
+              <a:t>https://bit.ly/2Xp20Vy</a:t>
+            </a:r>
+            <a:endParaRPr lang="en-US" dirty="0"/>
+          </a:p>
+          <a:p>
+            <a:pPr algn="ctr"/>
+            <a:endParaRPr lang="en-US" dirty="0"/>
+          </a:p>
+          <a:p>
+            <a:endParaRPr lang="en-US" dirty="0"/>
+          </a:p>
+        </p:txBody>
+      </p:sp>
+      <p:pic>
+        <p:nvPicPr>
+          <p:cNvPr id="1026" name="Picture 2" descr=".NET Meetup February 2019">
+            <a:extLst>
+              <a:ext uri="{FF2B5EF4-FFF2-40B4-BE49-F238E27FC236}">
+                <a16:creationId xmlns:a16="http://schemas.microsoft.com/office/drawing/2014/main" id="{86AACB85-F60B-42A0-B54A-C933783ACE30}"/>
+              </a:ext>
+            </a:extLst>
+          </p:cNvPr>
+          <p:cNvPicPr>
+            <a:picLocks noChangeAspect="1" noChangeArrowheads="1"/>
+          </p:cNvPicPr>
+          <p:nvPr/>
+        </p:nvPicPr>
+        <p:blipFill>
+          <a:blip r:embed="rId3">
+            <a:extLst>
+              <a:ext uri="{28A0092B-C50C-407E-A947-70E740481C1C}">
+                <a14:useLocalDpi xmlns:a14="http://schemas.microsoft.com/office/drawing/2010/main" val="0"/>
+              </a:ext>
+            </a:extLst>
+          </a:blip>
+          <a:srcRect/>
+          <a:stretch>
+            <a:fillRect/>
+          </a:stretch>
+        </p:blipFill>
+        <p:spPr bwMode="auto">
+          <a:xfrm>
+            <a:off x="4662626" y="2411027"/>
+            <a:ext cx="2866748" cy="2866748"/>
+          </a:xfrm>
+          <a:prstGeom prst="rect">
+            <a:avLst/>
+          </a:prstGeom>
+          <a:noFill/>
+          <a:extLst>
+            <a:ext uri="{909E8E84-426E-40DD-AFC4-6F175D3DCCD1}">
+              <a14:hiddenFill xmlns:a14="http://schemas.microsoft.com/office/drawing/2010/main">
+                <a:solidFill>
+                  <a:srgbClr val="FFFFFF"/>
+                </a:solidFill>
+              </a14:hiddenFill>
+            </a:ext>
+          </a:extLst>
+        </p:spPr>
+      </p:pic>
+    </p:spTree>
+    <p:extLst>
+      <p:ext uri="{BB962C8B-B14F-4D97-AF65-F5344CB8AC3E}">
+        <p14:creationId xmlns:p14="http://schemas.microsoft.com/office/powerpoint/2010/main" val="2707943805"/>
       </p:ext>
     </p:extLst>
   </p:cSld>

</xml_diff>